<commit_message>
Responsive table ed Icone
</commit_message>
<xml_diff>
--- a/MadMeteo/res/icons.pptx
+++ b/MadMeteo/res/icons.pptx
@@ -6,7 +6,8 @@
   </p:sldMasterIdLst>
   <p:sldIdLst>
     <p:sldId id="256" r:id="rId2"/>
-    <p:sldId id="257" r:id="rId3"/>
+    <p:sldId id="258" r:id="rId3"/>
+    <p:sldId id="257" r:id="rId4"/>
   </p:sldIdLst>
   <p:sldSz cx="12192000" cy="6858000"/>
   <p:notesSz cx="6858000" cy="9144000"/>
@@ -242,7 +243,7 @@
           <a:p>
             <a:fld id="{551FD8FC-7C72-4BD7-8D55-3B6D9C41F69A}" type="datetimeFigureOut">
               <a:rPr lang="it-IT" smtClean="0"/>
-              <a:t>19/01/2018</a:t>
+              <a:t>22/01/2018</a:t>
             </a:fld>
             <a:endParaRPr lang="it-IT"/>
           </a:p>
@@ -410,7 +411,7 @@
           <a:p>
             <a:fld id="{551FD8FC-7C72-4BD7-8D55-3B6D9C41F69A}" type="datetimeFigureOut">
               <a:rPr lang="it-IT" smtClean="0"/>
-              <a:t>19/01/2018</a:t>
+              <a:t>22/01/2018</a:t>
             </a:fld>
             <a:endParaRPr lang="it-IT"/>
           </a:p>
@@ -588,7 +589,7 @@
           <a:p>
             <a:fld id="{551FD8FC-7C72-4BD7-8D55-3B6D9C41F69A}" type="datetimeFigureOut">
               <a:rPr lang="it-IT" smtClean="0"/>
-              <a:t>19/01/2018</a:t>
+              <a:t>22/01/2018</a:t>
             </a:fld>
             <a:endParaRPr lang="it-IT"/>
           </a:p>
@@ -756,7 +757,7 @@
           <a:p>
             <a:fld id="{551FD8FC-7C72-4BD7-8D55-3B6D9C41F69A}" type="datetimeFigureOut">
               <a:rPr lang="it-IT" smtClean="0"/>
-              <a:t>19/01/2018</a:t>
+              <a:t>22/01/2018</a:t>
             </a:fld>
             <a:endParaRPr lang="it-IT"/>
           </a:p>
@@ -1001,7 +1002,7 @@
           <a:p>
             <a:fld id="{551FD8FC-7C72-4BD7-8D55-3B6D9C41F69A}" type="datetimeFigureOut">
               <a:rPr lang="it-IT" smtClean="0"/>
-              <a:t>19/01/2018</a:t>
+              <a:t>22/01/2018</a:t>
             </a:fld>
             <a:endParaRPr lang="it-IT"/>
           </a:p>
@@ -1230,7 +1231,7 @@
           <a:p>
             <a:fld id="{551FD8FC-7C72-4BD7-8D55-3B6D9C41F69A}" type="datetimeFigureOut">
               <a:rPr lang="it-IT" smtClean="0"/>
-              <a:t>19/01/2018</a:t>
+              <a:t>22/01/2018</a:t>
             </a:fld>
             <a:endParaRPr lang="it-IT"/>
           </a:p>
@@ -1594,7 +1595,7 @@
           <a:p>
             <a:fld id="{551FD8FC-7C72-4BD7-8D55-3B6D9C41F69A}" type="datetimeFigureOut">
               <a:rPr lang="it-IT" smtClean="0"/>
-              <a:t>19/01/2018</a:t>
+              <a:t>22/01/2018</a:t>
             </a:fld>
             <a:endParaRPr lang="it-IT"/>
           </a:p>
@@ -1711,7 +1712,7 @@
           <a:p>
             <a:fld id="{551FD8FC-7C72-4BD7-8D55-3B6D9C41F69A}" type="datetimeFigureOut">
               <a:rPr lang="it-IT" smtClean="0"/>
-              <a:t>19/01/2018</a:t>
+              <a:t>22/01/2018</a:t>
             </a:fld>
             <a:endParaRPr lang="it-IT"/>
           </a:p>
@@ -1806,7 +1807,7 @@
           <a:p>
             <a:fld id="{551FD8FC-7C72-4BD7-8D55-3B6D9C41F69A}" type="datetimeFigureOut">
               <a:rPr lang="it-IT" smtClean="0"/>
-              <a:t>19/01/2018</a:t>
+              <a:t>22/01/2018</a:t>
             </a:fld>
             <a:endParaRPr lang="it-IT"/>
           </a:p>
@@ -2081,7 +2082,7 @@
           <a:p>
             <a:fld id="{551FD8FC-7C72-4BD7-8D55-3B6D9C41F69A}" type="datetimeFigureOut">
               <a:rPr lang="it-IT" smtClean="0"/>
-              <a:t>19/01/2018</a:t>
+              <a:t>22/01/2018</a:t>
             </a:fld>
             <a:endParaRPr lang="it-IT"/>
           </a:p>
@@ -2333,7 +2334,7 @@
           <a:p>
             <a:fld id="{551FD8FC-7C72-4BD7-8D55-3B6D9C41F69A}" type="datetimeFigureOut">
               <a:rPr lang="it-IT" smtClean="0"/>
-              <a:t>19/01/2018</a:t>
+              <a:t>22/01/2018</a:t>
             </a:fld>
             <a:endParaRPr lang="it-IT"/>
           </a:p>
@@ -2544,7 +2545,7 @@
           <a:p>
             <a:fld id="{551FD8FC-7C72-4BD7-8D55-3B6D9C41F69A}" type="datetimeFigureOut">
               <a:rPr lang="it-IT" smtClean="0"/>
-              <a:t>19/01/2018</a:t>
+              <a:t>22/01/2018</a:t>
             </a:fld>
             <a:endParaRPr lang="it-IT"/>
           </a:p>
@@ -5970,190 +5971,6 @@
       </p:grpSp>
       <p:sp>
         <p:nvSpPr>
-          <p:cNvPr id="2" name="Arco 1"/>
-          <p:cNvSpPr/>
-          <p:nvPr/>
-        </p:nvSpPr>
-        <p:spPr>
-          <a:xfrm rot="15257565">
-            <a:off x="5555261" y="3919947"/>
-            <a:ext cx="771326" cy="1066789"/>
-          </a:xfrm>
-          <a:prstGeom prst="arc">
-            <a:avLst>
-              <a:gd name="adj1" fmla="val 12462840"/>
-              <a:gd name="adj2" fmla="val 19530734"/>
-            </a:avLst>
-          </a:prstGeom>
-          <a:ln w="76200">
-            <a:solidFill>
-              <a:schemeClr val="tx1"/>
-            </a:solidFill>
-          </a:ln>
-        </p:spPr>
-        <p:style>
-          <a:lnRef idx="1">
-            <a:schemeClr val="accent1"/>
-          </a:lnRef>
-          <a:fillRef idx="0">
-            <a:schemeClr val="accent1"/>
-          </a:fillRef>
-          <a:effectRef idx="0">
-            <a:schemeClr val="accent1"/>
-          </a:effectRef>
-          <a:fontRef idx="minor">
-            <a:schemeClr val="tx1"/>
-          </a:fontRef>
-        </p:style>
-        <p:txBody>
-          <a:bodyPr rtlCol="0" anchor="ctr"/>
-          <a:lstStyle/>
-          <a:p>
-            <a:pPr algn="ctr"/>
-            <a:endParaRPr lang="it-IT"/>
-          </a:p>
-        </p:txBody>
-      </p:sp>
-      <p:sp>
-        <p:nvSpPr>
-          <p:cNvPr id="116" name="Arco 115"/>
-          <p:cNvSpPr/>
-          <p:nvPr/>
-        </p:nvSpPr>
-        <p:spPr>
-          <a:xfrm rot="20668190">
-            <a:off x="5609578" y="3914044"/>
-            <a:ext cx="528395" cy="554252"/>
-          </a:xfrm>
-          <a:prstGeom prst="arc">
-            <a:avLst>
-              <a:gd name="adj1" fmla="val 11333933"/>
-              <a:gd name="adj2" fmla="val 20990327"/>
-            </a:avLst>
-          </a:prstGeom>
-          <a:ln w="76200">
-            <a:solidFill>
-              <a:schemeClr val="tx1"/>
-            </a:solidFill>
-          </a:ln>
-        </p:spPr>
-        <p:style>
-          <a:lnRef idx="1">
-            <a:schemeClr val="accent1"/>
-          </a:lnRef>
-          <a:fillRef idx="0">
-            <a:schemeClr val="accent1"/>
-          </a:fillRef>
-          <a:effectRef idx="0">
-            <a:schemeClr val="accent1"/>
-          </a:effectRef>
-          <a:fontRef idx="minor">
-            <a:schemeClr val="tx1"/>
-          </a:fontRef>
-        </p:style>
-        <p:txBody>
-          <a:bodyPr rtlCol="0" anchor="ctr"/>
-          <a:lstStyle/>
-          <a:p>
-            <a:pPr algn="ctr"/>
-            <a:endParaRPr lang="it-IT"/>
-          </a:p>
-        </p:txBody>
-      </p:sp>
-      <p:sp>
-        <p:nvSpPr>
-          <p:cNvPr id="117" name="Arco 116"/>
-          <p:cNvSpPr/>
-          <p:nvPr/>
-        </p:nvSpPr>
-        <p:spPr>
-          <a:xfrm rot="1227068">
-            <a:off x="6047734" y="3716544"/>
-            <a:ext cx="1085262" cy="1142595"/>
-          </a:xfrm>
-          <a:prstGeom prst="arc">
-            <a:avLst>
-              <a:gd name="adj1" fmla="val 11089154"/>
-              <a:gd name="adj2" fmla="val 20731690"/>
-            </a:avLst>
-          </a:prstGeom>
-          <a:ln w="76200">
-            <a:solidFill>
-              <a:schemeClr val="tx1"/>
-            </a:solidFill>
-          </a:ln>
-        </p:spPr>
-        <p:style>
-          <a:lnRef idx="1">
-            <a:schemeClr val="accent1"/>
-          </a:lnRef>
-          <a:fillRef idx="0">
-            <a:schemeClr val="accent1"/>
-          </a:fillRef>
-          <a:effectRef idx="0">
-            <a:schemeClr val="accent1"/>
-          </a:effectRef>
-          <a:fontRef idx="minor">
-            <a:schemeClr val="tx1"/>
-          </a:fontRef>
-        </p:style>
-        <p:txBody>
-          <a:bodyPr rtlCol="0" anchor="ctr"/>
-          <a:lstStyle/>
-          <a:p>
-            <a:pPr algn="ctr"/>
-            <a:endParaRPr lang="it-IT"/>
-          </a:p>
-        </p:txBody>
-      </p:sp>
-      <p:sp>
-        <p:nvSpPr>
-          <p:cNvPr id="118" name="Arco 117"/>
-          <p:cNvSpPr/>
-          <p:nvPr/>
-        </p:nvSpPr>
-        <p:spPr>
-          <a:xfrm rot="6726270">
-            <a:off x="6711679" y="4280343"/>
-            <a:ext cx="582769" cy="579742"/>
-          </a:xfrm>
-          <a:prstGeom prst="arc">
-            <a:avLst>
-              <a:gd name="adj1" fmla="val 10733869"/>
-              <a:gd name="adj2" fmla="val 20339489"/>
-            </a:avLst>
-          </a:prstGeom>
-          <a:ln w="76200">
-            <a:solidFill>
-              <a:schemeClr val="tx1"/>
-            </a:solidFill>
-          </a:ln>
-        </p:spPr>
-        <p:style>
-          <a:lnRef idx="1">
-            <a:schemeClr val="accent1"/>
-          </a:lnRef>
-          <a:fillRef idx="0">
-            <a:schemeClr val="accent1"/>
-          </a:fillRef>
-          <a:effectRef idx="0">
-            <a:schemeClr val="accent1"/>
-          </a:effectRef>
-          <a:fontRef idx="minor">
-            <a:schemeClr val="tx1"/>
-          </a:fontRef>
-        </p:style>
-        <p:txBody>
-          <a:bodyPr rtlCol="0" anchor="ctr"/>
-          <a:lstStyle/>
-          <a:p>
-            <a:pPr algn="ctr"/>
-            <a:endParaRPr lang="it-IT"/>
-          </a:p>
-        </p:txBody>
-      </p:sp>
-      <p:sp>
-        <p:nvSpPr>
           <p:cNvPr id="100" name="CasellaDiTesto 99"/>
           <p:cNvSpPr txBox="1"/>
           <p:nvPr/>
@@ -6356,6 +6173,281 @@
 </file>
 
 <file path=ppt/slides/slide2.xml><?xml version="1.0" encoding="utf-8"?>
+<p:sld xmlns:a="http://schemas.openxmlformats.org/drawingml/2006/main" xmlns:r="http://schemas.openxmlformats.org/officeDocument/2006/relationships" xmlns:p="http://schemas.openxmlformats.org/presentationml/2006/main">
+  <p:cSld>
+    <p:spTree>
+      <p:nvGrpSpPr>
+        <p:cNvPr id="1" name=""/>
+        <p:cNvGrpSpPr/>
+        <p:nvPr/>
+      </p:nvGrpSpPr>
+      <p:grpSpPr>
+        <a:xfrm>
+          <a:off x="0" y="0"/>
+          <a:ext cx="0" cy="0"/>
+          <a:chOff x="0" y="0"/>
+          <a:chExt cx="0" cy="0"/>
+        </a:xfrm>
+      </p:grpSpPr>
+      <p:grpSp>
+        <p:nvGrpSpPr>
+          <p:cNvPr id="8" name="Gruppo 7"/>
+          <p:cNvGrpSpPr/>
+          <p:nvPr/>
+        </p:nvGrpSpPr>
+        <p:grpSpPr>
+          <a:xfrm>
+            <a:off x="4938592" y="3899773"/>
+            <a:ext cx="1471156" cy="989590"/>
+            <a:chOff x="4367092" y="2788523"/>
+            <a:chExt cx="1471156" cy="989590"/>
+          </a:xfrm>
+        </p:grpSpPr>
+        <p:sp>
+          <p:nvSpPr>
+            <p:cNvPr id="3" name="Arco 2"/>
+            <p:cNvSpPr/>
+            <p:nvPr/>
+          </p:nvSpPr>
+          <p:spPr>
+            <a:xfrm rot="15257565">
+              <a:off x="4569438" y="2893111"/>
+              <a:ext cx="662098" cy="1066789"/>
+            </a:xfrm>
+            <a:prstGeom prst="arc">
+              <a:avLst>
+                <a:gd name="adj1" fmla="val 11806900"/>
+                <a:gd name="adj2" fmla="val 20024545"/>
+              </a:avLst>
+            </a:prstGeom>
+            <a:ln w="76200">
+              <a:solidFill>
+                <a:schemeClr val="tx1"/>
+              </a:solidFill>
+            </a:ln>
+          </p:spPr>
+          <p:style>
+            <a:lnRef idx="1">
+              <a:schemeClr val="accent1"/>
+            </a:lnRef>
+            <a:fillRef idx="0">
+              <a:schemeClr val="accent1"/>
+            </a:fillRef>
+            <a:effectRef idx="0">
+              <a:schemeClr val="accent1"/>
+            </a:effectRef>
+            <a:fontRef idx="minor">
+              <a:schemeClr val="tx1"/>
+            </a:fontRef>
+          </p:style>
+          <p:txBody>
+            <a:bodyPr rtlCol="0" anchor="ctr"/>
+            <a:lstStyle/>
+            <a:p>
+              <a:pPr algn="ctr"/>
+              <a:endParaRPr lang="it-IT"/>
+            </a:p>
+          </p:txBody>
+        </p:sp>
+        <p:sp>
+          <p:nvSpPr>
+            <p:cNvPr id="4" name="Arco 3"/>
+            <p:cNvSpPr/>
+            <p:nvPr/>
+          </p:nvSpPr>
+          <p:spPr>
+            <a:xfrm rot="2180380">
+              <a:off x="5167426" y="2891076"/>
+              <a:ext cx="457013" cy="408071"/>
+            </a:xfrm>
+            <a:prstGeom prst="arc">
+              <a:avLst>
+                <a:gd name="adj1" fmla="val 11333933"/>
+                <a:gd name="adj2" fmla="val 20990327"/>
+              </a:avLst>
+            </a:prstGeom>
+            <a:ln w="76200">
+              <a:solidFill>
+                <a:schemeClr val="tx1"/>
+              </a:solidFill>
+            </a:ln>
+          </p:spPr>
+          <p:style>
+            <a:lnRef idx="1">
+              <a:schemeClr val="accent1"/>
+            </a:lnRef>
+            <a:fillRef idx="0">
+              <a:schemeClr val="accent1"/>
+            </a:fillRef>
+            <a:effectRef idx="0">
+              <a:schemeClr val="accent1"/>
+            </a:effectRef>
+            <a:fontRef idx="minor">
+              <a:schemeClr val="tx1"/>
+            </a:fontRef>
+          </p:style>
+          <p:txBody>
+            <a:bodyPr rtlCol="0" anchor="ctr"/>
+            <a:lstStyle/>
+            <a:p>
+              <a:pPr algn="ctr"/>
+              <a:endParaRPr lang="it-IT"/>
+            </a:p>
+          </p:txBody>
+        </p:sp>
+        <p:sp>
+          <p:nvSpPr>
+            <p:cNvPr id="5" name="Arco 4"/>
+            <p:cNvSpPr/>
+            <p:nvPr/>
+          </p:nvSpPr>
+          <p:spPr>
+            <a:xfrm rot="21127153">
+              <a:off x="4652961" y="2788523"/>
+              <a:ext cx="688850" cy="739947"/>
+            </a:xfrm>
+            <a:prstGeom prst="arc">
+              <a:avLst>
+                <a:gd name="adj1" fmla="val 10804855"/>
+                <a:gd name="adj2" fmla="val 19830505"/>
+              </a:avLst>
+            </a:prstGeom>
+            <a:ln w="76200">
+              <a:solidFill>
+                <a:schemeClr val="tx1"/>
+              </a:solidFill>
+            </a:ln>
+          </p:spPr>
+          <p:style>
+            <a:lnRef idx="1">
+              <a:schemeClr val="accent1"/>
+            </a:lnRef>
+            <a:fillRef idx="0">
+              <a:schemeClr val="accent1"/>
+            </a:fillRef>
+            <a:effectRef idx="0">
+              <a:schemeClr val="accent1"/>
+            </a:effectRef>
+            <a:fontRef idx="minor">
+              <a:schemeClr val="tx1"/>
+            </a:fontRef>
+          </p:style>
+          <p:txBody>
+            <a:bodyPr rtlCol="0" anchor="ctr"/>
+            <a:lstStyle/>
+            <a:p>
+              <a:pPr algn="ctr"/>
+              <a:endParaRPr lang="it-IT"/>
+            </a:p>
+          </p:txBody>
+        </p:sp>
+        <p:sp>
+          <p:nvSpPr>
+            <p:cNvPr id="6" name="Arco 5"/>
+            <p:cNvSpPr/>
+            <p:nvPr/>
+          </p:nvSpPr>
+          <p:spPr>
+            <a:xfrm rot="6726270">
+              <a:off x="5132726" y="3068045"/>
+              <a:ext cx="647880" cy="763165"/>
+            </a:xfrm>
+            <a:prstGeom prst="arc">
+              <a:avLst>
+                <a:gd name="adj1" fmla="val 10733869"/>
+                <a:gd name="adj2" fmla="val 281018"/>
+              </a:avLst>
+            </a:prstGeom>
+            <a:ln w="76200">
+              <a:solidFill>
+                <a:schemeClr val="tx1"/>
+              </a:solidFill>
+            </a:ln>
+          </p:spPr>
+          <p:style>
+            <a:lnRef idx="1">
+              <a:schemeClr val="accent1"/>
+            </a:lnRef>
+            <a:fillRef idx="0">
+              <a:schemeClr val="accent1"/>
+            </a:fillRef>
+            <a:effectRef idx="0">
+              <a:schemeClr val="accent1"/>
+            </a:effectRef>
+            <a:fontRef idx="minor">
+              <a:schemeClr val="tx1"/>
+            </a:fontRef>
+          </p:style>
+          <p:txBody>
+            <a:bodyPr rtlCol="0" anchor="ctr"/>
+            <a:lstStyle/>
+            <a:p>
+              <a:pPr algn="ctr"/>
+              <a:endParaRPr lang="it-IT"/>
+            </a:p>
+          </p:txBody>
+        </p:sp>
+        <p:sp>
+          <p:nvSpPr>
+            <p:cNvPr id="7" name="Arco 6"/>
+            <p:cNvSpPr/>
+            <p:nvPr/>
+          </p:nvSpPr>
+          <p:spPr>
+            <a:xfrm rot="10017498">
+              <a:off x="4809771" y="3370042"/>
+              <a:ext cx="887599" cy="408071"/>
+            </a:xfrm>
+            <a:prstGeom prst="arc">
+              <a:avLst>
+                <a:gd name="adj1" fmla="val 15190785"/>
+                <a:gd name="adj2" fmla="val 20990327"/>
+              </a:avLst>
+            </a:prstGeom>
+            <a:ln w="76200">
+              <a:solidFill>
+                <a:schemeClr val="tx1"/>
+              </a:solidFill>
+            </a:ln>
+          </p:spPr>
+          <p:style>
+            <a:lnRef idx="1">
+              <a:schemeClr val="accent1"/>
+            </a:lnRef>
+            <a:fillRef idx="0">
+              <a:schemeClr val="accent1"/>
+            </a:fillRef>
+            <a:effectRef idx="0">
+              <a:schemeClr val="accent1"/>
+            </a:effectRef>
+            <a:fontRef idx="minor">
+              <a:schemeClr val="tx1"/>
+            </a:fontRef>
+          </p:style>
+          <p:txBody>
+            <a:bodyPr rtlCol="0" anchor="ctr"/>
+            <a:lstStyle/>
+            <a:p>
+              <a:pPr algn="ctr"/>
+              <a:endParaRPr lang="it-IT"/>
+            </a:p>
+          </p:txBody>
+        </p:sp>
+      </p:grpSp>
+    </p:spTree>
+    <p:extLst>
+      <p:ext uri="{BB962C8B-B14F-4D97-AF65-F5344CB8AC3E}">
+        <p14:creationId xmlns:p14="http://schemas.microsoft.com/office/powerpoint/2010/main" val="1457210272"/>
+      </p:ext>
+    </p:extLst>
+  </p:cSld>
+  <p:clrMapOvr>
+    <a:masterClrMapping/>
+  </p:clrMapOvr>
+</p:sld>
+</file>
+
+<file path=ppt/slides/slide3.xml><?xml version="1.0" encoding="utf-8"?>
 <p:sld xmlns:a="http://schemas.openxmlformats.org/drawingml/2006/main" xmlns:r="http://schemas.openxmlformats.org/officeDocument/2006/relationships" xmlns:p="http://schemas.openxmlformats.org/presentationml/2006/main">
   <p:cSld>
     <p:spTree>
@@ -6418,810 +6510,6 @@
           </a:p>
         </p:txBody>
       </p:sp>
-      <p:sp>
-        <p:nvSpPr>
-          <p:cNvPr id="28" name="Rettangolo 27"/>
-          <p:cNvSpPr/>
-          <p:nvPr/>
-        </p:nvSpPr>
-        <p:spPr>
-          <a:xfrm>
-            <a:off x="4030389" y="2619189"/>
-            <a:ext cx="704850" cy="476250"/>
-          </a:xfrm>
-          <a:prstGeom prst="rect">
-            <a:avLst/>
-          </a:prstGeom>
-          <a:ln>
-            <a:noFill/>
-          </a:ln>
-        </p:spPr>
-        <p:style>
-          <a:lnRef idx="2">
-            <a:schemeClr val="accent1">
-              <a:shade val="50000"/>
-            </a:schemeClr>
-          </a:lnRef>
-          <a:fillRef idx="1">
-            <a:schemeClr val="accent1"/>
-          </a:fillRef>
-          <a:effectRef idx="0">
-            <a:schemeClr val="accent1"/>
-          </a:effectRef>
-          <a:fontRef idx="minor">
-            <a:schemeClr val="lt1"/>
-          </a:fontRef>
-        </p:style>
-        <p:txBody>
-          <a:bodyPr rtlCol="0" anchor="ctr"/>
-          <a:lstStyle/>
-          <a:p>
-            <a:pPr algn="ctr"/>
-            <a:endParaRPr lang="it-IT"/>
-          </a:p>
-        </p:txBody>
-      </p:sp>
-      <p:cxnSp>
-        <p:nvCxnSpPr>
-          <p:cNvPr id="42" name="Connettore diritto 41"/>
-          <p:cNvCxnSpPr>
-            <a:endCxn id="45" idx="2"/>
-          </p:cNvCxnSpPr>
-          <p:nvPr/>
-        </p:nvCxnSpPr>
-        <p:spPr>
-          <a:xfrm flipV="1">
-            <a:off x="4117389" y="2866436"/>
-            <a:ext cx="468000" cy="2616"/>
-          </a:xfrm>
-          <a:prstGeom prst="line">
-            <a:avLst/>
-          </a:prstGeom>
-          <a:ln w="38100">
-            <a:solidFill>
-              <a:schemeClr val="bg1"/>
-            </a:solidFill>
-          </a:ln>
-        </p:spPr>
-        <p:style>
-          <a:lnRef idx="1">
-            <a:schemeClr val="accent1"/>
-          </a:lnRef>
-          <a:fillRef idx="0">
-            <a:schemeClr val="accent1"/>
-          </a:fillRef>
-          <a:effectRef idx="0">
-            <a:schemeClr val="accent1"/>
-          </a:effectRef>
-          <a:fontRef idx="minor">
-            <a:schemeClr val="tx1"/>
-          </a:fontRef>
-        </p:style>
-      </p:cxnSp>
-      <p:sp>
-        <p:nvSpPr>
-          <p:cNvPr id="43" name="Arco 42"/>
-          <p:cNvSpPr/>
-          <p:nvPr/>
-        </p:nvSpPr>
-        <p:spPr>
-          <a:xfrm rot="10586696">
-            <a:off x="4067058" y="2741801"/>
-            <a:ext cx="147279" cy="128835"/>
-          </a:xfrm>
-          <a:prstGeom prst="arc">
-            <a:avLst>
-              <a:gd name="adj1" fmla="val 17223013"/>
-              <a:gd name="adj2" fmla="val 9591909"/>
-            </a:avLst>
-          </a:prstGeom>
-          <a:ln w="38100">
-            <a:solidFill>
-              <a:schemeClr val="bg1"/>
-            </a:solidFill>
-          </a:ln>
-        </p:spPr>
-        <p:style>
-          <a:lnRef idx="1">
-            <a:schemeClr val="accent1"/>
-          </a:lnRef>
-          <a:fillRef idx="0">
-            <a:schemeClr val="accent1"/>
-          </a:fillRef>
-          <a:effectRef idx="0">
-            <a:schemeClr val="accent1"/>
-          </a:effectRef>
-          <a:fontRef idx="minor">
-            <a:schemeClr val="tx1"/>
-          </a:fontRef>
-        </p:style>
-        <p:txBody>
-          <a:bodyPr rtlCol="0" anchor="ctr"/>
-          <a:lstStyle/>
-          <a:p>
-            <a:pPr algn="ctr"/>
-            <a:endParaRPr lang="it-IT"/>
-          </a:p>
-        </p:txBody>
-      </p:sp>
-      <p:sp>
-        <p:nvSpPr>
-          <p:cNvPr id="44" name="Arco 43"/>
-          <p:cNvSpPr/>
-          <p:nvPr/>
-        </p:nvSpPr>
-        <p:spPr>
-          <a:xfrm rot="14060443">
-            <a:off x="4190694" y="2672841"/>
-            <a:ext cx="126225" cy="145605"/>
-          </a:xfrm>
-          <a:prstGeom prst="arc">
-            <a:avLst>
-              <a:gd name="adj1" fmla="val 17223013"/>
-              <a:gd name="adj2" fmla="val 7433507"/>
-            </a:avLst>
-          </a:prstGeom>
-          <a:ln w="38100">
-            <a:solidFill>
-              <a:schemeClr val="bg1"/>
-            </a:solidFill>
-          </a:ln>
-        </p:spPr>
-        <p:style>
-          <a:lnRef idx="1">
-            <a:schemeClr val="accent1"/>
-          </a:lnRef>
-          <a:fillRef idx="0">
-            <a:schemeClr val="accent1"/>
-          </a:fillRef>
-          <a:effectRef idx="0">
-            <a:schemeClr val="accent1"/>
-          </a:effectRef>
-          <a:fontRef idx="minor">
-            <a:schemeClr val="tx1"/>
-          </a:fontRef>
-        </p:style>
-        <p:txBody>
-          <a:bodyPr rtlCol="0" anchor="ctr"/>
-          <a:lstStyle/>
-          <a:p>
-            <a:pPr algn="ctr"/>
-            <a:endParaRPr lang="it-IT"/>
-          </a:p>
-        </p:txBody>
-      </p:sp>
-      <p:sp>
-        <p:nvSpPr>
-          <p:cNvPr id="45" name="Arco 44"/>
-          <p:cNvSpPr/>
-          <p:nvPr/>
-        </p:nvSpPr>
-        <p:spPr>
-          <a:xfrm rot="18677107">
-            <a:off x="4507002" y="2725491"/>
-            <a:ext cx="128835" cy="147279"/>
-          </a:xfrm>
-          <a:prstGeom prst="arc">
-            <a:avLst>
-              <a:gd name="adj1" fmla="val 18840227"/>
-              <a:gd name="adj2" fmla="val 8540461"/>
-            </a:avLst>
-          </a:prstGeom>
-          <a:ln w="38100">
-            <a:solidFill>
-              <a:schemeClr val="bg1"/>
-            </a:solidFill>
-          </a:ln>
-        </p:spPr>
-        <p:style>
-          <a:lnRef idx="1">
-            <a:schemeClr val="accent1"/>
-          </a:lnRef>
-          <a:fillRef idx="0">
-            <a:schemeClr val="accent1"/>
-          </a:fillRef>
-          <a:effectRef idx="0">
-            <a:schemeClr val="accent1"/>
-          </a:effectRef>
-          <a:fontRef idx="minor">
-            <a:schemeClr val="tx1"/>
-          </a:fontRef>
-        </p:style>
-        <p:txBody>
-          <a:bodyPr rtlCol="0" anchor="ctr"/>
-          <a:lstStyle/>
-          <a:p>
-            <a:pPr algn="ctr"/>
-            <a:endParaRPr lang="it-IT"/>
-          </a:p>
-        </p:txBody>
-      </p:sp>
-      <p:sp>
-        <p:nvSpPr>
-          <p:cNvPr id="50" name="Unità di visualizzazione grafica 49"/>
-          <p:cNvSpPr/>
-          <p:nvPr/>
-        </p:nvSpPr>
-        <p:spPr>
-          <a:xfrm rot="3847648">
-            <a:off x="4117807" y="2972921"/>
-            <a:ext cx="177035" cy="45719"/>
-          </a:xfrm>
-          <a:prstGeom prst="flowChartDisplay">
-            <a:avLst/>
-          </a:prstGeom>
-          <a:solidFill>
-            <a:schemeClr val="bg1"/>
-          </a:solidFill>
-          <a:ln>
-            <a:noFill/>
-          </a:ln>
-        </p:spPr>
-        <p:style>
-          <a:lnRef idx="2">
-            <a:schemeClr val="accent1">
-              <a:shade val="50000"/>
-            </a:schemeClr>
-          </a:lnRef>
-          <a:fillRef idx="1">
-            <a:schemeClr val="accent1"/>
-          </a:fillRef>
-          <a:effectRef idx="0">
-            <a:schemeClr val="accent1"/>
-          </a:effectRef>
-          <a:fontRef idx="minor">
-            <a:schemeClr val="lt1"/>
-          </a:fontRef>
-        </p:style>
-        <p:txBody>
-          <a:bodyPr rtlCol="0" anchor="ctr"/>
-          <a:lstStyle/>
-          <a:p>
-            <a:pPr algn="ctr"/>
-            <a:endParaRPr lang="it-IT"/>
-          </a:p>
-        </p:txBody>
-      </p:sp>
-      <p:sp>
-        <p:nvSpPr>
-          <p:cNvPr id="53" name="Unità di visualizzazione grafica 52"/>
-          <p:cNvSpPr/>
-          <p:nvPr/>
-        </p:nvSpPr>
-        <p:spPr>
-          <a:xfrm rot="3847648">
-            <a:off x="4246981" y="2972920"/>
-            <a:ext cx="177035" cy="45719"/>
-          </a:xfrm>
-          <a:prstGeom prst="flowChartDisplay">
-            <a:avLst/>
-          </a:prstGeom>
-          <a:solidFill>
-            <a:schemeClr val="bg1"/>
-          </a:solidFill>
-          <a:ln>
-            <a:noFill/>
-          </a:ln>
-        </p:spPr>
-        <p:style>
-          <a:lnRef idx="2">
-            <a:schemeClr val="accent1">
-              <a:shade val="50000"/>
-            </a:schemeClr>
-          </a:lnRef>
-          <a:fillRef idx="1">
-            <a:schemeClr val="accent1"/>
-          </a:fillRef>
-          <a:effectRef idx="0">
-            <a:schemeClr val="accent1"/>
-          </a:effectRef>
-          <a:fontRef idx="minor">
-            <a:schemeClr val="lt1"/>
-          </a:fontRef>
-        </p:style>
-        <p:txBody>
-          <a:bodyPr rtlCol="0" anchor="ctr"/>
-          <a:lstStyle/>
-          <a:p>
-            <a:pPr algn="ctr"/>
-            <a:endParaRPr lang="it-IT"/>
-          </a:p>
-        </p:txBody>
-      </p:sp>
-      <p:sp>
-        <p:nvSpPr>
-          <p:cNvPr id="54" name="Unità di visualizzazione grafica 53"/>
-          <p:cNvSpPr/>
-          <p:nvPr/>
-        </p:nvSpPr>
-        <p:spPr>
-          <a:xfrm rot="3847648">
-            <a:off x="4368732" y="2971770"/>
-            <a:ext cx="177035" cy="45719"/>
-          </a:xfrm>
-          <a:prstGeom prst="flowChartDisplay">
-            <a:avLst/>
-          </a:prstGeom>
-          <a:solidFill>
-            <a:schemeClr val="bg1"/>
-          </a:solidFill>
-          <a:ln>
-            <a:noFill/>
-          </a:ln>
-        </p:spPr>
-        <p:style>
-          <a:lnRef idx="2">
-            <a:schemeClr val="accent1">
-              <a:shade val="50000"/>
-            </a:schemeClr>
-          </a:lnRef>
-          <a:fillRef idx="1">
-            <a:schemeClr val="accent1"/>
-          </a:fillRef>
-          <a:effectRef idx="0">
-            <a:schemeClr val="accent1"/>
-          </a:effectRef>
-          <a:fontRef idx="minor">
-            <a:schemeClr val="lt1"/>
-          </a:fontRef>
-        </p:style>
-        <p:txBody>
-          <a:bodyPr rtlCol="0" anchor="ctr"/>
-          <a:lstStyle/>
-          <a:p>
-            <a:pPr algn="ctr"/>
-            <a:endParaRPr lang="it-IT"/>
-          </a:p>
-        </p:txBody>
-      </p:sp>
-      <p:sp>
-        <p:nvSpPr>
-          <p:cNvPr id="56" name="Arco 55"/>
-          <p:cNvSpPr/>
-          <p:nvPr/>
-        </p:nvSpPr>
-        <p:spPr>
-          <a:xfrm rot="16200000">
-            <a:off x="4308286" y="2658890"/>
-            <a:ext cx="126225" cy="145605"/>
-          </a:xfrm>
-          <a:prstGeom prst="arc">
-            <a:avLst>
-              <a:gd name="adj1" fmla="val 17223013"/>
-              <a:gd name="adj2" fmla="val 6561607"/>
-            </a:avLst>
-          </a:prstGeom>
-          <a:ln w="38100">
-            <a:solidFill>
-              <a:schemeClr val="bg1"/>
-            </a:solidFill>
-          </a:ln>
-        </p:spPr>
-        <p:style>
-          <a:lnRef idx="1">
-            <a:schemeClr val="accent1"/>
-          </a:lnRef>
-          <a:fillRef idx="0">
-            <a:schemeClr val="accent1"/>
-          </a:fillRef>
-          <a:effectRef idx="0">
-            <a:schemeClr val="accent1"/>
-          </a:effectRef>
-          <a:fontRef idx="minor">
-            <a:schemeClr val="tx1"/>
-          </a:fontRef>
-        </p:style>
-        <p:txBody>
-          <a:bodyPr rtlCol="0" anchor="ctr"/>
-          <a:lstStyle/>
-          <a:p>
-            <a:pPr algn="ctr"/>
-            <a:endParaRPr lang="it-IT"/>
-          </a:p>
-        </p:txBody>
-      </p:sp>
-      <p:sp>
-        <p:nvSpPr>
-          <p:cNvPr id="57" name="Arco 56"/>
-          <p:cNvSpPr/>
-          <p:nvPr/>
-        </p:nvSpPr>
-        <p:spPr>
-          <a:xfrm rot="16200000">
-            <a:off x="4444982" y="2683561"/>
-            <a:ext cx="126225" cy="145605"/>
-          </a:xfrm>
-          <a:prstGeom prst="arc">
-            <a:avLst>
-              <a:gd name="adj1" fmla="val 17223013"/>
-              <a:gd name="adj2" fmla="val 6053463"/>
-            </a:avLst>
-          </a:prstGeom>
-          <a:ln w="38100">
-            <a:solidFill>
-              <a:schemeClr val="bg1"/>
-            </a:solidFill>
-          </a:ln>
-        </p:spPr>
-        <p:style>
-          <a:lnRef idx="1">
-            <a:schemeClr val="accent1"/>
-          </a:lnRef>
-          <a:fillRef idx="0">
-            <a:schemeClr val="accent1"/>
-          </a:fillRef>
-          <a:effectRef idx="0">
-            <a:schemeClr val="accent1"/>
-          </a:effectRef>
-          <a:fontRef idx="minor">
-            <a:schemeClr val="tx1"/>
-          </a:fontRef>
-        </p:style>
-        <p:txBody>
-          <a:bodyPr rtlCol="0" anchor="ctr"/>
-          <a:lstStyle/>
-          <a:p>
-            <a:pPr algn="ctr"/>
-            <a:endParaRPr lang="it-IT"/>
-          </a:p>
-        </p:txBody>
-      </p:sp>
-      <p:sp>
-        <p:nvSpPr>
-          <p:cNvPr id="62" name="Unità di visualizzazione grafica 61"/>
-          <p:cNvSpPr/>
-          <p:nvPr/>
-        </p:nvSpPr>
-        <p:spPr>
-          <a:xfrm rot="3847648">
-            <a:off x="4490484" y="2969185"/>
-            <a:ext cx="177035" cy="45719"/>
-          </a:xfrm>
-          <a:prstGeom prst="flowChartDisplay">
-            <a:avLst/>
-          </a:prstGeom>
-          <a:solidFill>
-            <a:schemeClr val="bg1"/>
-          </a:solidFill>
-          <a:ln>
-            <a:noFill/>
-          </a:ln>
-        </p:spPr>
-        <p:style>
-          <a:lnRef idx="2">
-            <a:schemeClr val="accent1">
-              <a:shade val="50000"/>
-            </a:schemeClr>
-          </a:lnRef>
-          <a:fillRef idx="1">
-            <a:schemeClr val="accent1"/>
-          </a:fillRef>
-          <a:effectRef idx="0">
-            <a:schemeClr val="accent1"/>
-          </a:effectRef>
-          <a:fontRef idx="minor">
-            <a:schemeClr val="lt1"/>
-          </a:fontRef>
-        </p:style>
-        <p:txBody>
-          <a:bodyPr rtlCol="0" anchor="ctr"/>
-          <a:lstStyle/>
-          <a:p>
-            <a:pPr algn="ctr"/>
-            <a:endParaRPr lang="it-IT"/>
-          </a:p>
-        </p:txBody>
-      </p:sp>
-      <p:sp>
-        <p:nvSpPr>
-          <p:cNvPr id="74" name="Rettangolo 73"/>
-          <p:cNvSpPr/>
-          <p:nvPr/>
-        </p:nvSpPr>
-        <p:spPr>
-          <a:xfrm>
-            <a:off x="4048849" y="3543114"/>
-            <a:ext cx="704850" cy="476250"/>
-          </a:xfrm>
-          <a:prstGeom prst="rect">
-            <a:avLst/>
-          </a:prstGeom>
-          <a:ln>
-            <a:noFill/>
-          </a:ln>
-        </p:spPr>
-        <p:style>
-          <a:lnRef idx="2">
-            <a:schemeClr val="accent1">
-              <a:shade val="50000"/>
-            </a:schemeClr>
-          </a:lnRef>
-          <a:fillRef idx="1">
-            <a:schemeClr val="accent1"/>
-          </a:fillRef>
-          <a:effectRef idx="0">
-            <a:schemeClr val="accent1"/>
-          </a:effectRef>
-          <a:fontRef idx="minor">
-            <a:schemeClr val="lt1"/>
-          </a:fontRef>
-        </p:style>
-        <p:txBody>
-          <a:bodyPr rtlCol="0" anchor="ctr"/>
-          <a:lstStyle/>
-          <a:p>
-            <a:pPr algn="ctr"/>
-            <a:endParaRPr lang="it-IT"/>
-          </a:p>
-        </p:txBody>
-      </p:sp>
-      <p:sp>
-        <p:nvSpPr>
-          <p:cNvPr id="75" name="Arco 74"/>
-          <p:cNvSpPr/>
-          <p:nvPr/>
-        </p:nvSpPr>
-        <p:spPr>
-          <a:xfrm rot="3944990">
-            <a:off x="4319687" y="3800737"/>
-            <a:ext cx="180000" cy="180000"/>
-          </a:xfrm>
-          <a:prstGeom prst="arc">
-            <a:avLst>
-              <a:gd name="adj1" fmla="val 13910424"/>
-              <a:gd name="adj2" fmla="val 10556461"/>
-            </a:avLst>
-          </a:prstGeom>
-          <a:ln w="38100">
-            <a:solidFill>
-              <a:schemeClr val="bg1"/>
-            </a:solidFill>
-          </a:ln>
-        </p:spPr>
-        <p:style>
-          <a:lnRef idx="1">
-            <a:schemeClr val="accent1"/>
-          </a:lnRef>
-          <a:fillRef idx="0">
-            <a:schemeClr val="accent1"/>
-          </a:fillRef>
-          <a:effectRef idx="0">
-            <a:schemeClr val="accent1"/>
-          </a:effectRef>
-          <a:fontRef idx="minor">
-            <a:schemeClr val="tx1"/>
-          </a:fontRef>
-        </p:style>
-        <p:txBody>
-          <a:bodyPr rtlCol="0" anchor="ctr"/>
-          <a:lstStyle/>
-          <a:p>
-            <a:pPr algn="ctr"/>
-            <a:endParaRPr lang="it-IT"/>
-          </a:p>
-        </p:txBody>
-      </p:sp>
-      <p:cxnSp>
-        <p:nvCxnSpPr>
-          <p:cNvPr id="78" name="Connettore diritto 77"/>
-          <p:cNvCxnSpPr/>
-          <p:nvPr/>
-        </p:nvCxnSpPr>
-        <p:spPr>
-          <a:xfrm>
-            <a:off x="4362890" y="3638550"/>
-            <a:ext cx="0" cy="187138"/>
-          </a:xfrm>
-          <a:prstGeom prst="line">
-            <a:avLst/>
-          </a:prstGeom>
-          <a:ln w="38100">
-            <a:solidFill>
-              <a:schemeClr val="bg1"/>
-            </a:solidFill>
-          </a:ln>
-        </p:spPr>
-        <p:style>
-          <a:lnRef idx="1">
-            <a:schemeClr val="accent1"/>
-          </a:lnRef>
-          <a:fillRef idx="0">
-            <a:schemeClr val="accent1"/>
-          </a:fillRef>
-          <a:effectRef idx="0">
-            <a:schemeClr val="accent1"/>
-          </a:effectRef>
-          <a:fontRef idx="minor">
-            <a:schemeClr val="tx1"/>
-          </a:fontRef>
-        </p:style>
-      </p:cxnSp>
-      <p:cxnSp>
-        <p:nvCxnSpPr>
-          <p:cNvPr id="82" name="Connettore diritto 81"/>
-          <p:cNvCxnSpPr/>
-          <p:nvPr/>
-        </p:nvCxnSpPr>
-        <p:spPr>
-          <a:xfrm>
-            <a:off x="4458264" y="3638550"/>
-            <a:ext cx="0" cy="187138"/>
-          </a:xfrm>
-          <a:prstGeom prst="line">
-            <a:avLst/>
-          </a:prstGeom>
-          <a:ln w="38100">
-            <a:solidFill>
-              <a:schemeClr val="bg1"/>
-            </a:solidFill>
-          </a:ln>
-        </p:spPr>
-        <p:style>
-          <a:lnRef idx="1">
-            <a:schemeClr val="accent1"/>
-          </a:lnRef>
-          <a:fillRef idx="0">
-            <a:schemeClr val="accent1"/>
-          </a:fillRef>
-          <a:effectRef idx="0">
-            <a:schemeClr val="accent1"/>
-          </a:effectRef>
-          <a:fontRef idx="minor">
-            <a:schemeClr val="tx1"/>
-          </a:fontRef>
-        </p:style>
-      </p:cxnSp>
-      <p:sp>
-        <p:nvSpPr>
-          <p:cNvPr id="83" name="Arco 82"/>
-          <p:cNvSpPr/>
-          <p:nvPr/>
-        </p:nvSpPr>
-        <p:spPr>
-          <a:xfrm rot="16200000">
-            <a:off x="4350941" y="3599029"/>
-            <a:ext cx="117492" cy="94714"/>
-          </a:xfrm>
-          <a:prstGeom prst="arc">
-            <a:avLst>
-              <a:gd name="adj1" fmla="val 16177640"/>
-              <a:gd name="adj2" fmla="val 5563629"/>
-            </a:avLst>
-          </a:prstGeom>
-          <a:ln w="38100">
-            <a:solidFill>
-              <a:schemeClr val="bg1"/>
-            </a:solidFill>
-          </a:ln>
-        </p:spPr>
-        <p:style>
-          <a:lnRef idx="1">
-            <a:schemeClr val="accent1"/>
-          </a:lnRef>
-          <a:fillRef idx="0">
-            <a:schemeClr val="accent1"/>
-          </a:fillRef>
-          <a:effectRef idx="0">
-            <a:schemeClr val="accent1"/>
-          </a:effectRef>
-          <a:fontRef idx="minor">
-            <a:schemeClr val="tx1"/>
-          </a:fontRef>
-        </p:style>
-        <p:txBody>
-          <a:bodyPr rtlCol="0" anchor="ctr"/>
-          <a:lstStyle/>
-          <a:p>
-            <a:pPr algn="ctr"/>
-            <a:endParaRPr lang="it-IT"/>
-          </a:p>
-        </p:txBody>
-      </p:sp>
-      <p:cxnSp>
-        <p:nvCxnSpPr>
-          <p:cNvPr id="88" name="Connettore diritto 87"/>
-          <p:cNvCxnSpPr/>
-          <p:nvPr/>
-        </p:nvCxnSpPr>
-        <p:spPr>
-          <a:xfrm flipV="1">
-            <a:off x="4362330" y="3670113"/>
-            <a:ext cx="60562" cy="3362"/>
-          </a:xfrm>
-          <a:prstGeom prst="line">
-            <a:avLst/>
-          </a:prstGeom>
-          <a:ln w="19050">
-            <a:solidFill>
-              <a:schemeClr val="bg1"/>
-            </a:solidFill>
-          </a:ln>
-        </p:spPr>
-        <p:style>
-          <a:lnRef idx="1">
-            <a:schemeClr val="accent1"/>
-          </a:lnRef>
-          <a:fillRef idx="0">
-            <a:schemeClr val="accent1"/>
-          </a:fillRef>
-          <a:effectRef idx="0">
-            <a:schemeClr val="accent1"/>
-          </a:effectRef>
-          <a:fontRef idx="minor">
-            <a:schemeClr val="tx1"/>
-          </a:fontRef>
-        </p:style>
-      </p:cxnSp>
-      <p:cxnSp>
-        <p:nvCxnSpPr>
-          <p:cNvPr id="90" name="Connettore diritto 89"/>
-          <p:cNvCxnSpPr/>
-          <p:nvPr/>
-        </p:nvCxnSpPr>
-        <p:spPr>
-          <a:xfrm flipV="1">
-            <a:off x="4365704" y="3709474"/>
-            <a:ext cx="60562" cy="3362"/>
-          </a:xfrm>
-          <a:prstGeom prst="line">
-            <a:avLst/>
-          </a:prstGeom>
-          <a:ln w="19050">
-            <a:solidFill>
-              <a:schemeClr val="bg1"/>
-            </a:solidFill>
-          </a:ln>
-        </p:spPr>
-        <p:style>
-          <a:lnRef idx="1">
-            <a:schemeClr val="accent1"/>
-          </a:lnRef>
-          <a:fillRef idx="0">
-            <a:schemeClr val="accent1"/>
-          </a:fillRef>
-          <a:effectRef idx="0">
-            <a:schemeClr val="accent1"/>
-          </a:effectRef>
-          <a:fontRef idx="minor">
-            <a:schemeClr val="tx1"/>
-          </a:fontRef>
-        </p:style>
-      </p:cxnSp>
-      <p:cxnSp>
-        <p:nvCxnSpPr>
-          <p:cNvPr id="91" name="Connettore diritto 90"/>
-          <p:cNvCxnSpPr/>
-          <p:nvPr/>
-        </p:nvCxnSpPr>
-        <p:spPr>
-          <a:xfrm flipV="1">
-            <a:off x="4368440" y="3749658"/>
-            <a:ext cx="60562" cy="3362"/>
-          </a:xfrm>
-          <a:prstGeom prst="line">
-            <a:avLst/>
-          </a:prstGeom>
-          <a:ln w="19050">
-            <a:solidFill>
-              <a:schemeClr val="bg1"/>
-            </a:solidFill>
-          </a:ln>
-        </p:spPr>
-        <p:style>
-          <a:lnRef idx="1">
-            <a:schemeClr val="accent1"/>
-          </a:lnRef>
-          <a:fillRef idx="0">
-            <a:schemeClr val="accent1"/>
-          </a:fillRef>
-          <a:effectRef idx="0">
-            <a:schemeClr val="accent1"/>
-          </a:effectRef>
-          <a:fontRef idx="minor">
-            <a:schemeClr val="tx1"/>
-          </a:fontRef>
-        </p:style>
-      </p:cxnSp>
       <p:grpSp>
         <p:nvGrpSpPr>
           <p:cNvPr id="9" name="Gruppo 8"/>
@@ -7278,7 +6566,7 @@
             <a:lstStyle/>
             <a:p>
               <a:pPr algn="ctr"/>
-              <a:endParaRPr lang="it-IT"/>
+              <a:endParaRPr lang="it-IT" dirty="0"/>
             </a:p>
           </p:txBody>
         </p:sp>
@@ -7482,6 +6770,2602 @@
             </p:txBody>
           </p:sp>
         </p:grpSp>
+      </p:grpSp>
+      <p:grpSp>
+        <p:nvGrpSpPr>
+          <p:cNvPr id="4" name="Gruppo 3"/>
+          <p:cNvGrpSpPr/>
+          <p:nvPr/>
+        </p:nvGrpSpPr>
+        <p:grpSpPr>
+          <a:xfrm>
+            <a:off x="5512483" y="382240"/>
+            <a:ext cx="2160000" cy="1800000"/>
+            <a:chOff x="5012750" y="2095779"/>
+            <a:chExt cx="2160000" cy="1800000"/>
+          </a:xfrm>
+        </p:grpSpPr>
+        <p:sp>
+          <p:nvSpPr>
+            <p:cNvPr id="36" name="Rettangolo 35"/>
+            <p:cNvSpPr/>
+            <p:nvPr/>
+          </p:nvSpPr>
+          <p:spPr>
+            <a:xfrm>
+              <a:off x="5012750" y="2095779"/>
+              <a:ext cx="2160000" cy="1800000"/>
+            </a:xfrm>
+            <a:prstGeom prst="rect">
+              <a:avLst/>
+            </a:prstGeom>
+            <a:solidFill>
+              <a:srgbClr val="01579B"/>
+            </a:solidFill>
+            <a:ln>
+              <a:noFill/>
+            </a:ln>
+          </p:spPr>
+          <p:style>
+            <a:lnRef idx="2">
+              <a:schemeClr val="accent1">
+                <a:shade val="50000"/>
+              </a:schemeClr>
+            </a:lnRef>
+            <a:fillRef idx="1">
+              <a:schemeClr val="accent1"/>
+            </a:fillRef>
+            <a:effectRef idx="0">
+              <a:schemeClr val="accent1"/>
+            </a:effectRef>
+            <a:fontRef idx="minor">
+              <a:schemeClr val="lt1"/>
+            </a:fontRef>
+          </p:style>
+          <p:txBody>
+            <a:bodyPr rtlCol="0" anchor="ctr"/>
+            <a:lstStyle/>
+            <a:p>
+              <a:pPr algn="ctr"/>
+              <a:endParaRPr lang="it-IT"/>
+            </a:p>
+          </p:txBody>
+        </p:sp>
+        <p:grpSp>
+          <p:nvGrpSpPr>
+            <p:cNvPr id="29" name="Gruppo 28"/>
+            <p:cNvGrpSpPr/>
+            <p:nvPr/>
+          </p:nvGrpSpPr>
+          <p:grpSpPr>
+            <a:xfrm>
+              <a:off x="5355833" y="2324305"/>
+              <a:ext cx="1471156" cy="989590"/>
+              <a:chOff x="4367092" y="2610723"/>
+              <a:chExt cx="1471156" cy="989590"/>
+            </a:xfrm>
+          </p:grpSpPr>
+          <p:sp>
+            <p:nvSpPr>
+              <p:cNvPr id="30" name="Arco 29"/>
+              <p:cNvSpPr/>
+              <p:nvPr/>
+            </p:nvSpPr>
+            <p:spPr>
+              <a:xfrm rot="15257565">
+                <a:off x="4569438" y="2715311"/>
+                <a:ext cx="662098" cy="1066789"/>
+              </a:xfrm>
+              <a:prstGeom prst="arc">
+                <a:avLst>
+                  <a:gd name="adj1" fmla="val 11806900"/>
+                  <a:gd name="adj2" fmla="val 20024545"/>
+                </a:avLst>
+              </a:prstGeom>
+              <a:ln w="76200">
+                <a:solidFill>
+                  <a:schemeClr val="bg1"/>
+                </a:solidFill>
+              </a:ln>
+            </p:spPr>
+            <p:style>
+              <a:lnRef idx="1">
+                <a:schemeClr val="accent1"/>
+              </a:lnRef>
+              <a:fillRef idx="0">
+                <a:schemeClr val="accent1"/>
+              </a:fillRef>
+              <a:effectRef idx="0">
+                <a:schemeClr val="accent1"/>
+              </a:effectRef>
+              <a:fontRef idx="minor">
+                <a:schemeClr val="tx1"/>
+              </a:fontRef>
+            </p:style>
+            <p:txBody>
+              <a:bodyPr rtlCol="0" anchor="ctr"/>
+              <a:lstStyle/>
+              <a:p>
+                <a:pPr algn="ctr"/>
+                <a:endParaRPr lang="it-IT"/>
+              </a:p>
+            </p:txBody>
+          </p:sp>
+          <p:sp>
+            <p:nvSpPr>
+              <p:cNvPr id="31" name="Arco 30"/>
+              <p:cNvSpPr/>
+              <p:nvPr/>
+            </p:nvSpPr>
+            <p:spPr>
+              <a:xfrm rot="2180380">
+                <a:off x="5167426" y="2713276"/>
+                <a:ext cx="457013" cy="408071"/>
+              </a:xfrm>
+              <a:prstGeom prst="arc">
+                <a:avLst>
+                  <a:gd name="adj1" fmla="val 11333933"/>
+                  <a:gd name="adj2" fmla="val 20990327"/>
+                </a:avLst>
+              </a:prstGeom>
+              <a:ln w="76200">
+                <a:solidFill>
+                  <a:schemeClr val="bg1"/>
+                </a:solidFill>
+              </a:ln>
+            </p:spPr>
+            <p:style>
+              <a:lnRef idx="1">
+                <a:schemeClr val="accent1"/>
+              </a:lnRef>
+              <a:fillRef idx="0">
+                <a:schemeClr val="accent1"/>
+              </a:fillRef>
+              <a:effectRef idx="0">
+                <a:schemeClr val="accent1"/>
+              </a:effectRef>
+              <a:fontRef idx="minor">
+                <a:schemeClr val="tx1"/>
+              </a:fontRef>
+            </p:style>
+            <p:txBody>
+              <a:bodyPr rtlCol="0" anchor="ctr"/>
+              <a:lstStyle/>
+              <a:p>
+                <a:pPr algn="ctr"/>
+                <a:endParaRPr lang="it-IT"/>
+              </a:p>
+            </p:txBody>
+          </p:sp>
+          <p:sp>
+            <p:nvSpPr>
+              <p:cNvPr id="32" name="Arco 31"/>
+              <p:cNvSpPr/>
+              <p:nvPr/>
+            </p:nvSpPr>
+            <p:spPr>
+              <a:xfrm rot="21127153">
+                <a:off x="4652961" y="2610723"/>
+                <a:ext cx="688850" cy="739947"/>
+              </a:xfrm>
+              <a:prstGeom prst="arc">
+                <a:avLst>
+                  <a:gd name="adj1" fmla="val 10804855"/>
+                  <a:gd name="adj2" fmla="val 19830505"/>
+                </a:avLst>
+              </a:prstGeom>
+              <a:ln w="76200">
+                <a:solidFill>
+                  <a:schemeClr val="bg1"/>
+                </a:solidFill>
+              </a:ln>
+            </p:spPr>
+            <p:style>
+              <a:lnRef idx="1">
+                <a:schemeClr val="accent1"/>
+              </a:lnRef>
+              <a:fillRef idx="0">
+                <a:schemeClr val="accent1"/>
+              </a:fillRef>
+              <a:effectRef idx="0">
+                <a:schemeClr val="accent1"/>
+              </a:effectRef>
+              <a:fontRef idx="minor">
+                <a:schemeClr val="tx1"/>
+              </a:fontRef>
+            </p:style>
+            <p:txBody>
+              <a:bodyPr rtlCol="0" anchor="ctr"/>
+              <a:lstStyle/>
+              <a:p>
+                <a:pPr algn="ctr"/>
+                <a:endParaRPr lang="it-IT"/>
+              </a:p>
+            </p:txBody>
+          </p:sp>
+          <p:sp>
+            <p:nvSpPr>
+              <p:cNvPr id="33" name="Arco 32"/>
+              <p:cNvSpPr/>
+              <p:nvPr/>
+            </p:nvSpPr>
+            <p:spPr>
+              <a:xfrm rot="6726270">
+                <a:off x="5132726" y="2890245"/>
+                <a:ext cx="647880" cy="763165"/>
+              </a:xfrm>
+              <a:prstGeom prst="arc">
+                <a:avLst>
+                  <a:gd name="adj1" fmla="val 10733869"/>
+                  <a:gd name="adj2" fmla="val 281018"/>
+                </a:avLst>
+              </a:prstGeom>
+              <a:ln w="76200">
+                <a:solidFill>
+                  <a:schemeClr val="bg1"/>
+                </a:solidFill>
+              </a:ln>
+            </p:spPr>
+            <p:style>
+              <a:lnRef idx="1">
+                <a:schemeClr val="accent1"/>
+              </a:lnRef>
+              <a:fillRef idx="0">
+                <a:schemeClr val="accent1"/>
+              </a:fillRef>
+              <a:effectRef idx="0">
+                <a:schemeClr val="accent1"/>
+              </a:effectRef>
+              <a:fontRef idx="minor">
+                <a:schemeClr val="tx1"/>
+              </a:fontRef>
+            </p:style>
+            <p:txBody>
+              <a:bodyPr rtlCol="0" anchor="ctr"/>
+              <a:lstStyle/>
+              <a:p>
+                <a:pPr algn="ctr"/>
+                <a:endParaRPr lang="it-IT"/>
+              </a:p>
+            </p:txBody>
+          </p:sp>
+          <p:sp>
+            <p:nvSpPr>
+              <p:cNvPr id="34" name="Arco 33"/>
+              <p:cNvSpPr/>
+              <p:nvPr/>
+            </p:nvSpPr>
+            <p:spPr>
+              <a:xfrm rot="10017498">
+                <a:off x="4809771" y="3192242"/>
+                <a:ext cx="887599" cy="408071"/>
+              </a:xfrm>
+              <a:prstGeom prst="arc">
+                <a:avLst>
+                  <a:gd name="adj1" fmla="val 15190785"/>
+                  <a:gd name="adj2" fmla="val 20990327"/>
+                </a:avLst>
+              </a:prstGeom>
+              <a:ln w="76200">
+                <a:solidFill>
+                  <a:schemeClr val="bg1"/>
+                </a:solidFill>
+              </a:ln>
+            </p:spPr>
+            <p:style>
+              <a:lnRef idx="1">
+                <a:schemeClr val="accent1"/>
+              </a:lnRef>
+              <a:fillRef idx="0">
+                <a:schemeClr val="accent1"/>
+              </a:fillRef>
+              <a:effectRef idx="0">
+                <a:schemeClr val="accent1"/>
+              </a:effectRef>
+              <a:fontRef idx="minor">
+                <a:schemeClr val="tx1"/>
+              </a:fontRef>
+            </p:style>
+            <p:txBody>
+              <a:bodyPr rtlCol="0" anchor="ctr"/>
+              <a:lstStyle/>
+              <a:p>
+                <a:pPr algn="ctr"/>
+                <a:endParaRPr lang="it-IT"/>
+              </a:p>
+            </p:txBody>
+          </p:sp>
+        </p:grpSp>
+      </p:grpSp>
+      <p:sp>
+        <p:nvSpPr>
+          <p:cNvPr id="38" name="Unità di visualizzazione grafica 37"/>
+          <p:cNvSpPr/>
+          <p:nvPr/>
+        </p:nvSpPr>
+        <p:spPr>
+          <a:xfrm rot="3847648">
+            <a:off x="6025383" y="1839133"/>
+            <a:ext cx="288000" cy="72000"/>
+          </a:xfrm>
+          <a:prstGeom prst="flowChartDisplay">
+            <a:avLst/>
+          </a:prstGeom>
+          <a:solidFill>
+            <a:schemeClr val="bg1"/>
+          </a:solidFill>
+          <a:ln>
+            <a:noFill/>
+          </a:ln>
+        </p:spPr>
+        <p:style>
+          <a:lnRef idx="2">
+            <a:schemeClr val="accent1">
+              <a:shade val="50000"/>
+            </a:schemeClr>
+          </a:lnRef>
+          <a:fillRef idx="1">
+            <a:schemeClr val="accent1"/>
+          </a:fillRef>
+          <a:effectRef idx="0">
+            <a:schemeClr val="accent1"/>
+          </a:effectRef>
+          <a:fontRef idx="minor">
+            <a:schemeClr val="lt1"/>
+          </a:fontRef>
+        </p:style>
+        <p:txBody>
+          <a:bodyPr rtlCol="0" anchor="ctr"/>
+          <a:lstStyle/>
+          <a:p>
+            <a:pPr algn="ctr"/>
+            <a:endParaRPr lang="it-IT"/>
+          </a:p>
+        </p:txBody>
+      </p:sp>
+      <p:sp>
+        <p:nvSpPr>
+          <p:cNvPr id="39" name="Unità di visualizzazione grafica 38"/>
+          <p:cNvSpPr/>
+          <p:nvPr/>
+        </p:nvSpPr>
+        <p:spPr>
+          <a:xfrm rot="3847648">
+            <a:off x="6322958" y="1824865"/>
+            <a:ext cx="288000" cy="72000"/>
+          </a:xfrm>
+          <a:prstGeom prst="flowChartDisplay">
+            <a:avLst/>
+          </a:prstGeom>
+          <a:solidFill>
+            <a:schemeClr val="bg1"/>
+          </a:solidFill>
+          <a:ln>
+            <a:noFill/>
+          </a:ln>
+        </p:spPr>
+        <p:style>
+          <a:lnRef idx="2">
+            <a:schemeClr val="accent1">
+              <a:shade val="50000"/>
+            </a:schemeClr>
+          </a:lnRef>
+          <a:fillRef idx="1">
+            <a:schemeClr val="accent1"/>
+          </a:fillRef>
+          <a:effectRef idx="0">
+            <a:schemeClr val="accent1"/>
+          </a:effectRef>
+          <a:fontRef idx="minor">
+            <a:schemeClr val="lt1"/>
+          </a:fontRef>
+        </p:style>
+        <p:txBody>
+          <a:bodyPr rtlCol="0" anchor="ctr"/>
+          <a:lstStyle/>
+          <a:p>
+            <a:pPr algn="ctr"/>
+            <a:endParaRPr lang="it-IT"/>
+          </a:p>
+        </p:txBody>
+      </p:sp>
+      <p:sp>
+        <p:nvSpPr>
+          <p:cNvPr id="40" name="Unità di visualizzazione grafica 39"/>
+          <p:cNvSpPr/>
+          <p:nvPr/>
+        </p:nvSpPr>
+        <p:spPr>
+          <a:xfrm rot="3847648">
+            <a:off x="6620534" y="1831519"/>
+            <a:ext cx="288000" cy="72000"/>
+          </a:xfrm>
+          <a:prstGeom prst="flowChartDisplay">
+            <a:avLst/>
+          </a:prstGeom>
+          <a:solidFill>
+            <a:schemeClr val="bg1"/>
+          </a:solidFill>
+          <a:ln>
+            <a:noFill/>
+          </a:ln>
+        </p:spPr>
+        <p:style>
+          <a:lnRef idx="2">
+            <a:schemeClr val="accent1">
+              <a:shade val="50000"/>
+            </a:schemeClr>
+          </a:lnRef>
+          <a:fillRef idx="1">
+            <a:schemeClr val="accent1"/>
+          </a:fillRef>
+          <a:effectRef idx="0">
+            <a:schemeClr val="accent1"/>
+          </a:effectRef>
+          <a:fontRef idx="minor">
+            <a:schemeClr val="lt1"/>
+          </a:fontRef>
+        </p:style>
+        <p:txBody>
+          <a:bodyPr rtlCol="0" anchor="ctr"/>
+          <a:lstStyle/>
+          <a:p>
+            <a:pPr algn="ctr"/>
+            <a:endParaRPr lang="it-IT"/>
+          </a:p>
+        </p:txBody>
+      </p:sp>
+      <p:sp>
+        <p:nvSpPr>
+          <p:cNvPr id="41" name="Unità di visualizzazione grafica 40"/>
+          <p:cNvSpPr/>
+          <p:nvPr/>
+        </p:nvSpPr>
+        <p:spPr>
+          <a:xfrm rot="3847648">
+            <a:off x="6905236" y="1831520"/>
+            <a:ext cx="288000" cy="72000"/>
+          </a:xfrm>
+          <a:prstGeom prst="flowChartDisplay">
+            <a:avLst/>
+          </a:prstGeom>
+          <a:solidFill>
+            <a:schemeClr val="bg1"/>
+          </a:solidFill>
+          <a:ln>
+            <a:noFill/>
+          </a:ln>
+        </p:spPr>
+        <p:style>
+          <a:lnRef idx="2">
+            <a:schemeClr val="accent1">
+              <a:shade val="50000"/>
+            </a:schemeClr>
+          </a:lnRef>
+          <a:fillRef idx="1">
+            <a:schemeClr val="accent1"/>
+          </a:fillRef>
+          <a:effectRef idx="0">
+            <a:schemeClr val="accent1"/>
+          </a:effectRef>
+          <a:fontRef idx="minor">
+            <a:schemeClr val="lt1"/>
+          </a:fontRef>
+        </p:style>
+        <p:txBody>
+          <a:bodyPr rtlCol="0" anchor="ctr"/>
+          <a:lstStyle/>
+          <a:p>
+            <a:pPr algn="ctr"/>
+            <a:endParaRPr lang="it-IT"/>
+          </a:p>
+        </p:txBody>
+      </p:sp>
+      <p:sp>
+        <p:nvSpPr>
+          <p:cNvPr id="47" name="Rettangolo 46"/>
+          <p:cNvSpPr/>
+          <p:nvPr/>
+        </p:nvSpPr>
+        <p:spPr>
+          <a:xfrm>
+            <a:off x="7851306" y="393033"/>
+            <a:ext cx="2160000" cy="1800000"/>
+          </a:xfrm>
+          <a:prstGeom prst="rect">
+            <a:avLst/>
+          </a:prstGeom>
+          <a:solidFill>
+            <a:srgbClr val="01579B"/>
+          </a:solidFill>
+          <a:ln>
+            <a:noFill/>
+          </a:ln>
+        </p:spPr>
+        <p:style>
+          <a:lnRef idx="2">
+            <a:schemeClr val="accent1">
+              <a:shade val="50000"/>
+            </a:schemeClr>
+          </a:lnRef>
+          <a:fillRef idx="1">
+            <a:schemeClr val="accent1"/>
+          </a:fillRef>
+          <a:effectRef idx="0">
+            <a:schemeClr val="accent1"/>
+          </a:effectRef>
+          <a:fontRef idx="minor">
+            <a:schemeClr val="lt1"/>
+          </a:fontRef>
+        </p:style>
+        <p:txBody>
+          <a:bodyPr rtlCol="0" anchor="ctr"/>
+          <a:lstStyle/>
+          <a:p>
+            <a:pPr algn="ctr"/>
+            <a:endParaRPr lang="it-IT"/>
+          </a:p>
+        </p:txBody>
+      </p:sp>
+      <p:grpSp>
+        <p:nvGrpSpPr>
+          <p:cNvPr id="6" name="Gruppo 5"/>
+          <p:cNvGrpSpPr/>
+          <p:nvPr/>
+        </p:nvGrpSpPr>
+        <p:grpSpPr>
+          <a:xfrm>
+            <a:off x="8643306" y="635351"/>
+            <a:ext cx="576000" cy="1285992"/>
+            <a:chOff x="8643306" y="635351"/>
+            <a:chExt cx="576000" cy="1285992"/>
+          </a:xfrm>
+        </p:grpSpPr>
+        <p:sp>
+          <p:nvSpPr>
+            <p:cNvPr id="48" name="Arco 47"/>
+            <p:cNvSpPr/>
+            <p:nvPr/>
+          </p:nvSpPr>
+          <p:spPr>
+            <a:xfrm rot="3944990">
+              <a:off x="8643306" y="1345343"/>
+              <a:ext cx="576000" cy="576000"/>
+            </a:xfrm>
+            <a:prstGeom prst="arc">
+              <a:avLst>
+                <a:gd name="adj1" fmla="val 13910424"/>
+                <a:gd name="adj2" fmla="val 10556461"/>
+              </a:avLst>
+            </a:prstGeom>
+            <a:ln w="76200">
+              <a:solidFill>
+                <a:schemeClr val="bg1"/>
+              </a:solidFill>
+            </a:ln>
+          </p:spPr>
+          <p:style>
+            <a:lnRef idx="1">
+              <a:schemeClr val="accent1"/>
+            </a:lnRef>
+            <a:fillRef idx="0">
+              <a:schemeClr val="accent1"/>
+            </a:fillRef>
+            <a:effectRef idx="0">
+              <a:schemeClr val="accent1"/>
+            </a:effectRef>
+            <a:fontRef idx="minor">
+              <a:schemeClr val="tx1"/>
+            </a:fontRef>
+          </p:style>
+          <p:txBody>
+            <a:bodyPr rtlCol="0" anchor="ctr"/>
+            <a:lstStyle/>
+            <a:p>
+              <a:pPr algn="ctr"/>
+              <a:endParaRPr lang="it-IT"/>
+            </a:p>
+          </p:txBody>
+        </p:sp>
+        <p:cxnSp>
+          <p:nvCxnSpPr>
+            <p:cNvPr id="51" name="Connettore diritto 50"/>
+            <p:cNvCxnSpPr/>
+            <p:nvPr/>
+          </p:nvCxnSpPr>
+          <p:spPr>
+            <a:xfrm>
+              <a:off x="9077920" y="799741"/>
+              <a:ext cx="0" cy="612000"/>
+            </a:xfrm>
+            <a:prstGeom prst="line">
+              <a:avLst/>
+            </a:prstGeom>
+            <a:ln w="76200">
+              <a:solidFill>
+                <a:schemeClr val="bg1"/>
+              </a:solidFill>
+            </a:ln>
+          </p:spPr>
+          <p:style>
+            <a:lnRef idx="1">
+              <a:schemeClr val="accent1"/>
+            </a:lnRef>
+            <a:fillRef idx="0">
+              <a:schemeClr val="accent1"/>
+            </a:fillRef>
+            <a:effectRef idx="0">
+              <a:schemeClr val="accent1"/>
+            </a:effectRef>
+            <a:fontRef idx="minor">
+              <a:schemeClr val="tx1"/>
+            </a:fontRef>
+          </p:style>
+        </p:cxnSp>
+        <p:cxnSp>
+          <p:nvCxnSpPr>
+            <p:cNvPr id="52" name="Connettore diritto 51"/>
+            <p:cNvCxnSpPr/>
+            <p:nvPr/>
+          </p:nvCxnSpPr>
+          <p:spPr>
+            <a:xfrm>
+              <a:off x="8785820" y="799741"/>
+              <a:ext cx="0" cy="612000"/>
+            </a:xfrm>
+            <a:prstGeom prst="line">
+              <a:avLst/>
+            </a:prstGeom>
+            <a:ln w="76200">
+              <a:solidFill>
+                <a:schemeClr val="bg1"/>
+              </a:solidFill>
+            </a:ln>
+          </p:spPr>
+          <p:style>
+            <a:lnRef idx="1">
+              <a:schemeClr val="accent1"/>
+            </a:lnRef>
+            <a:fillRef idx="0">
+              <a:schemeClr val="accent1"/>
+            </a:fillRef>
+            <a:effectRef idx="0">
+              <a:schemeClr val="accent1"/>
+            </a:effectRef>
+            <a:fontRef idx="minor">
+              <a:schemeClr val="tx1"/>
+            </a:fontRef>
+          </p:style>
+        </p:cxnSp>
+        <p:sp>
+          <p:nvSpPr>
+            <p:cNvPr id="55" name="Arco 54"/>
+            <p:cNvSpPr/>
+            <p:nvPr/>
+          </p:nvSpPr>
+          <p:spPr>
+            <a:xfrm rot="16200000">
+              <a:off x="8753920" y="671351"/>
+              <a:ext cx="360000" cy="288000"/>
+            </a:xfrm>
+            <a:prstGeom prst="arc">
+              <a:avLst>
+                <a:gd name="adj1" fmla="val 16177640"/>
+                <a:gd name="adj2" fmla="val 5563629"/>
+              </a:avLst>
+            </a:prstGeom>
+            <a:ln w="76200">
+              <a:solidFill>
+                <a:schemeClr val="bg1"/>
+              </a:solidFill>
+            </a:ln>
+          </p:spPr>
+          <p:style>
+            <a:lnRef idx="1">
+              <a:schemeClr val="accent1"/>
+            </a:lnRef>
+            <a:fillRef idx="0">
+              <a:schemeClr val="accent1"/>
+            </a:fillRef>
+            <a:effectRef idx="0">
+              <a:schemeClr val="accent1"/>
+            </a:effectRef>
+            <a:fontRef idx="minor">
+              <a:schemeClr val="tx1"/>
+            </a:fontRef>
+          </p:style>
+          <p:txBody>
+            <a:bodyPr rtlCol="0" anchor="ctr"/>
+            <a:lstStyle/>
+            <a:p>
+              <a:pPr algn="ctr"/>
+              <a:endParaRPr lang="it-IT"/>
+            </a:p>
+          </p:txBody>
+        </p:sp>
+      </p:grpSp>
+      <p:cxnSp>
+        <p:nvCxnSpPr>
+          <p:cNvPr id="58" name="Connettore diritto 57"/>
+          <p:cNvCxnSpPr/>
+          <p:nvPr/>
+        </p:nvCxnSpPr>
+        <p:spPr>
+          <a:xfrm flipV="1">
+            <a:off x="8789919" y="888641"/>
+            <a:ext cx="180000" cy="7692"/>
+          </a:xfrm>
+          <a:prstGeom prst="line">
+            <a:avLst/>
+          </a:prstGeom>
+          <a:ln w="38100">
+            <a:solidFill>
+              <a:schemeClr val="bg1"/>
+            </a:solidFill>
+          </a:ln>
+        </p:spPr>
+        <p:style>
+          <a:lnRef idx="1">
+            <a:schemeClr val="accent1"/>
+          </a:lnRef>
+          <a:fillRef idx="0">
+            <a:schemeClr val="accent1"/>
+          </a:fillRef>
+          <a:effectRef idx="0">
+            <a:schemeClr val="accent1"/>
+          </a:effectRef>
+          <a:fontRef idx="minor">
+            <a:schemeClr val="tx1"/>
+          </a:fontRef>
+        </p:style>
+      </p:cxnSp>
+      <p:cxnSp>
+        <p:nvCxnSpPr>
+          <p:cNvPr id="59" name="Connettore diritto 58"/>
+          <p:cNvCxnSpPr/>
+          <p:nvPr/>
+        </p:nvCxnSpPr>
+        <p:spPr>
+          <a:xfrm flipV="1">
+            <a:off x="8789919" y="1034691"/>
+            <a:ext cx="180000" cy="7692"/>
+          </a:xfrm>
+          <a:prstGeom prst="line">
+            <a:avLst/>
+          </a:prstGeom>
+          <a:ln w="38100">
+            <a:solidFill>
+              <a:schemeClr val="bg1"/>
+            </a:solidFill>
+          </a:ln>
+        </p:spPr>
+        <p:style>
+          <a:lnRef idx="1">
+            <a:schemeClr val="accent1"/>
+          </a:lnRef>
+          <a:fillRef idx="0">
+            <a:schemeClr val="accent1"/>
+          </a:fillRef>
+          <a:effectRef idx="0">
+            <a:schemeClr val="accent1"/>
+          </a:effectRef>
+          <a:fontRef idx="minor">
+            <a:schemeClr val="tx1"/>
+          </a:fontRef>
+        </p:style>
+      </p:cxnSp>
+      <p:cxnSp>
+        <p:nvCxnSpPr>
+          <p:cNvPr id="60" name="Connettore diritto 59"/>
+          <p:cNvCxnSpPr/>
+          <p:nvPr/>
+        </p:nvCxnSpPr>
+        <p:spPr>
+          <a:xfrm flipV="1">
+            <a:off x="8789919" y="1161691"/>
+            <a:ext cx="180000" cy="7692"/>
+          </a:xfrm>
+          <a:prstGeom prst="line">
+            <a:avLst/>
+          </a:prstGeom>
+          <a:ln w="38100">
+            <a:solidFill>
+              <a:schemeClr val="bg1"/>
+            </a:solidFill>
+          </a:ln>
+        </p:spPr>
+        <p:style>
+          <a:lnRef idx="1">
+            <a:schemeClr val="accent1"/>
+          </a:lnRef>
+          <a:fillRef idx="0">
+            <a:schemeClr val="accent1"/>
+          </a:fillRef>
+          <a:effectRef idx="0">
+            <a:schemeClr val="accent1"/>
+          </a:effectRef>
+          <a:fontRef idx="minor">
+            <a:schemeClr val="tx1"/>
+          </a:fontRef>
+        </p:style>
+      </p:cxnSp>
+      <p:grpSp>
+        <p:nvGrpSpPr>
+          <p:cNvPr id="17" name="Gruppo 16"/>
+          <p:cNvGrpSpPr/>
+          <p:nvPr/>
+        </p:nvGrpSpPr>
+        <p:grpSpPr>
+          <a:xfrm>
+            <a:off x="3190588" y="2539131"/>
+            <a:ext cx="2160000" cy="1800000"/>
+            <a:chOff x="3190588" y="2539131"/>
+            <a:chExt cx="2160000" cy="1800000"/>
+          </a:xfrm>
+        </p:grpSpPr>
+        <p:sp>
+          <p:nvSpPr>
+            <p:cNvPr id="61" name="Rettangolo 60"/>
+            <p:cNvSpPr/>
+            <p:nvPr/>
+          </p:nvSpPr>
+          <p:spPr>
+            <a:xfrm>
+              <a:off x="3190588" y="2539131"/>
+              <a:ext cx="2160000" cy="1800000"/>
+            </a:xfrm>
+            <a:prstGeom prst="rect">
+              <a:avLst/>
+            </a:prstGeom>
+            <a:solidFill>
+              <a:srgbClr val="01579B"/>
+            </a:solidFill>
+            <a:ln>
+              <a:noFill/>
+            </a:ln>
+          </p:spPr>
+          <p:style>
+            <a:lnRef idx="2">
+              <a:schemeClr val="accent1">
+                <a:shade val="50000"/>
+              </a:schemeClr>
+            </a:lnRef>
+            <a:fillRef idx="1">
+              <a:schemeClr val="accent1"/>
+            </a:fillRef>
+            <a:effectRef idx="0">
+              <a:schemeClr val="accent1"/>
+            </a:effectRef>
+            <a:fontRef idx="minor">
+              <a:schemeClr val="lt1"/>
+            </a:fontRef>
+          </p:style>
+          <p:txBody>
+            <a:bodyPr rtlCol="0" anchor="ctr"/>
+            <a:lstStyle/>
+            <a:p>
+              <a:pPr algn="ctr"/>
+              <a:endParaRPr lang="it-IT" dirty="0"/>
+            </a:p>
+          </p:txBody>
+        </p:sp>
+        <p:grpSp>
+          <p:nvGrpSpPr>
+            <p:cNvPr id="16" name="Gruppo 15"/>
+            <p:cNvGrpSpPr/>
+            <p:nvPr/>
+          </p:nvGrpSpPr>
+          <p:grpSpPr>
+            <a:xfrm>
+              <a:off x="3617263" y="3107117"/>
+              <a:ext cx="1268550" cy="940618"/>
+              <a:chOff x="3657467" y="2999167"/>
+              <a:chExt cx="1268550" cy="940618"/>
+            </a:xfrm>
+          </p:grpSpPr>
+          <p:sp>
+            <p:nvSpPr>
+              <p:cNvPr id="64" name="Goccia 63"/>
+              <p:cNvSpPr/>
+              <p:nvPr/>
+            </p:nvSpPr>
+            <p:spPr>
+              <a:xfrm rot="18860224">
+                <a:off x="4134017" y="2999167"/>
+                <a:ext cx="792000" cy="792000"/>
+              </a:xfrm>
+              <a:prstGeom prst="teardrop">
+                <a:avLst>
+                  <a:gd name="adj" fmla="val 120335"/>
+                </a:avLst>
+              </a:prstGeom>
+              <a:noFill/>
+              <a:ln w="76200">
+                <a:solidFill>
+                  <a:schemeClr val="bg1"/>
+                </a:solidFill>
+              </a:ln>
+            </p:spPr>
+            <p:style>
+              <a:lnRef idx="2">
+                <a:schemeClr val="accent1">
+                  <a:shade val="50000"/>
+                </a:schemeClr>
+              </a:lnRef>
+              <a:fillRef idx="1">
+                <a:schemeClr val="accent1"/>
+              </a:fillRef>
+              <a:effectRef idx="0">
+                <a:schemeClr val="accent1"/>
+              </a:effectRef>
+              <a:fontRef idx="minor">
+                <a:schemeClr val="lt1"/>
+              </a:fontRef>
+            </p:style>
+            <p:txBody>
+              <a:bodyPr rtlCol="0" anchor="ctr"/>
+              <a:lstStyle/>
+              <a:p>
+                <a:pPr algn="ctr"/>
+                <a:endParaRPr lang="it-IT"/>
+              </a:p>
+            </p:txBody>
+          </p:sp>
+          <p:sp>
+            <p:nvSpPr>
+              <p:cNvPr id="63" name="Goccia 62"/>
+              <p:cNvSpPr/>
+              <p:nvPr/>
+            </p:nvSpPr>
+            <p:spPr>
+              <a:xfrm rot="18860224">
+                <a:off x="3895742" y="3075367"/>
+                <a:ext cx="792000" cy="792000"/>
+              </a:xfrm>
+              <a:prstGeom prst="teardrop">
+                <a:avLst>
+                  <a:gd name="adj" fmla="val 120335"/>
+                </a:avLst>
+              </a:prstGeom>
+              <a:solidFill>
+                <a:srgbClr val="01579B"/>
+              </a:solidFill>
+              <a:ln w="76200">
+                <a:solidFill>
+                  <a:schemeClr val="bg1"/>
+                </a:solidFill>
+              </a:ln>
+            </p:spPr>
+            <p:style>
+              <a:lnRef idx="2">
+                <a:schemeClr val="accent1">
+                  <a:shade val="50000"/>
+                </a:schemeClr>
+              </a:lnRef>
+              <a:fillRef idx="1">
+                <a:schemeClr val="accent1"/>
+              </a:fillRef>
+              <a:effectRef idx="0">
+                <a:schemeClr val="accent1"/>
+              </a:effectRef>
+              <a:fontRef idx="minor">
+                <a:schemeClr val="lt1"/>
+              </a:fontRef>
+            </p:style>
+            <p:txBody>
+              <a:bodyPr rtlCol="0" anchor="ctr"/>
+              <a:lstStyle/>
+              <a:p>
+                <a:pPr algn="ctr"/>
+                <a:endParaRPr lang="it-IT"/>
+              </a:p>
+            </p:txBody>
+          </p:sp>
+          <p:sp>
+            <p:nvSpPr>
+              <p:cNvPr id="15" name="Goccia 14"/>
+              <p:cNvSpPr/>
+              <p:nvPr/>
+            </p:nvSpPr>
+            <p:spPr>
+              <a:xfrm rot="18860224">
+                <a:off x="3657467" y="3147785"/>
+                <a:ext cx="792000" cy="792000"/>
+              </a:xfrm>
+              <a:prstGeom prst="teardrop">
+                <a:avLst>
+                  <a:gd name="adj" fmla="val 120335"/>
+                </a:avLst>
+              </a:prstGeom>
+              <a:solidFill>
+                <a:srgbClr val="01579B"/>
+              </a:solidFill>
+              <a:ln w="76200">
+                <a:solidFill>
+                  <a:schemeClr val="bg1"/>
+                </a:solidFill>
+              </a:ln>
+            </p:spPr>
+            <p:style>
+              <a:lnRef idx="2">
+                <a:schemeClr val="accent1">
+                  <a:shade val="50000"/>
+                </a:schemeClr>
+              </a:lnRef>
+              <a:fillRef idx="1">
+                <a:schemeClr val="accent1"/>
+              </a:fillRef>
+              <a:effectRef idx="0">
+                <a:schemeClr val="accent1"/>
+              </a:effectRef>
+              <a:fontRef idx="minor">
+                <a:schemeClr val="lt1"/>
+              </a:fontRef>
+            </p:style>
+            <p:txBody>
+              <a:bodyPr rtlCol="0" anchor="ctr"/>
+              <a:lstStyle/>
+              <a:p>
+                <a:pPr algn="ctr"/>
+                <a:endParaRPr lang="it-IT"/>
+              </a:p>
+            </p:txBody>
+          </p:sp>
+        </p:grpSp>
+      </p:grpSp>
+      <p:sp>
+        <p:nvSpPr>
+          <p:cNvPr id="65" name="Rettangolo 64"/>
+          <p:cNvSpPr/>
+          <p:nvPr/>
+        </p:nvSpPr>
+        <p:spPr>
+          <a:xfrm>
+            <a:off x="5512483" y="2539131"/>
+            <a:ext cx="2160000" cy="1800000"/>
+          </a:xfrm>
+          <a:prstGeom prst="rect">
+            <a:avLst/>
+          </a:prstGeom>
+          <a:solidFill>
+            <a:srgbClr val="01579B"/>
+          </a:solidFill>
+          <a:ln>
+            <a:noFill/>
+          </a:ln>
+        </p:spPr>
+        <p:style>
+          <a:lnRef idx="2">
+            <a:schemeClr val="accent1">
+              <a:shade val="50000"/>
+            </a:schemeClr>
+          </a:lnRef>
+          <a:fillRef idx="1">
+            <a:schemeClr val="accent1"/>
+          </a:fillRef>
+          <a:effectRef idx="0">
+            <a:schemeClr val="accent1"/>
+          </a:effectRef>
+          <a:fontRef idx="minor">
+            <a:schemeClr val="lt1"/>
+          </a:fontRef>
+        </p:style>
+        <p:txBody>
+          <a:bodyPr rtlCol="0" anchor="ctr"/>
+          <a:lstStyle/>
+          <a:p>
+            <a:pPr algn="ctr"/>
+            <a:endParaRPr lang="it-IT" dirty="0"/>
+          </a:p>
+        </p:txBody>
+      </p:sp>
+      <p:sp>
+        <p:nvSpPr>
+          <p:cNvPr id="66" name="Arco 65"/>
+          <p:cNvSpPr/>
+          <p:nvPr/>
+        </p:nvSpPr>
+        <p:spPr>
+          <a:xfrm rot="905421">
+            <a:off x="5326192" y="3750565"/>
+            <a:ext cx="1948943" cy="1404000"/>
+          </a:xfrm>
+          <a:prstGeom prst="arc">
+            <a:avLst>
+              <a:gd name="adj1" fmla="val 12291665"/>
+              <a:gd name="adj2" fmla="val 19926403"/>
+            </a:avLst>
+          </a:prstGeom>
+          <a:ln w="76200">
+            <a:solidFill>
+              <a:schemeClr val="bg1"/>
+            </a:solidFill>
+          </a:ln>
+        </p:spPr>
+        <p:style>
+          <a:lnRef idx="1">
+            <a:schemeClr val="accent1"/>
+          </a:lnRef>
+          <a:fillRef idx="0">
+            <a:schemeClr val="accent1"/>
+          </a:fillRef>
+          <a:effectRef idx="0">
+            <a:schemeClr val="accent1"/>
+          </a:effectRef>
+          <a:fontRef idx="minor">
+            <a:schemeClr val="tx1"/>
+          </a:fontRef>
+        </p:style>
+        <p:txBody>
+          <a:bodyPr rtlCol="0" anchor="ctr"/>
+          <a:lstStyle/>
+          <a:p>
+            <a:pPr algn="ctr"/>
+            <a:endParaRPr lang="it-IT"/>
+          </a:p>
+        </p:txBody>
+      </p:sp>
+      <p:sp>
+        <p:nvSpPr>
+          <p:cNvPr id="22" name="Ovale 21"/>
+          <p:cNvSpPr/>
+          <p:nvPr/>
+        </p:nvSpPr>
+        <p:spPr>
+          <a:xfrm>
+            <a:off x="6536676" y="2800250"/>
+            <a:ext cx="216000" cy="216000"/>
+          </a:xfrm>
+          <a:prstGeom prst="ellipse">
+            <a:avLst/>
+          </a:prstGeom>
+          <a:noFill/>
+          <a:ln w="76200">
+            <a:solidFill>
+              <a:schemeClr val="bg1"/>
+            </a:solidFill>
+          </a:ln>
+        </p:spPr>
+        <p:style>
+          <a:lnRef idx="2">
+            <a:schemeClr val="accent1">
+              <a:shade val="50000"/>
+            </a:schemeClr>
+          </a:lnRef>
+          <a:fillRef idx="1">
+            <a:schemeClr val="accent1"/>
+          </a:fillRef>
+          <a:effectRef idx="0">
+            <a:schemeClr val="accent1"/>
+          </a:effectRef>
+          <a:fontRef idx="minor">
+            <a:schemeClr val="lt1"/>
+          </a:fontRef>
+        </p:style>
+        <p:txBody>
+          <a:bodyPr rtlCol="0" anchor="ctr"/>
+          <a:lstStyle/>
+          <a:p>
+            <a:pPr algn="ctr"/>
+            <a:endParaRPr lang="it-IT"/>
+          </a:p>
+        </p:txBody>
+      </p:sp>
+      <p:sp>
+        <p:nvSpPr>
+          <p:cNvPr id="23" name="Operazione manuale 22"/>
+          <p:cNvSpPr/>
+          <p:nvPr/>
+        </p:nvSpPr>
+        <p:spPr>
+          <a:xfrm rot="10800000">
+            <a:off x="6318421" y="3043958"/>
+            <a:ext cx="652511" cy="524782"/>
+          </a:xfrm>
+          <a:prstGeom prst="flowChartManualOperation">
+            <a:avLst/>
+          </a:prstGeom>
+          <a:noFill/>
+          <a:ln w="76200">
+            <a:solidFill>
+              <a:schemeClr val="bg1"/>
+            </a:solidFill>
+          </a:ln>
+        </p:spPr>
+        <p:style>
+          <a:lnRef idx="2">
+            <a:schemeClr val="accent1">
+              <a:shade val="50000"/>
+            </a:schemeClr>
+          </a:lnRef>
+          <a:fillRef idx="1">
+            <a:schemeClr val="accent1"/>
+          </a:fillRef>
+          <a:effectRef idx="0">
+            <a:schemeClr val="accent1"/>
+          </a:effectRef>
+          <a:fontRef idx="minor">
+            <a:schemeClr val="lt1"/>
+          </a:fontRef>
+        </p:style>
+        <p:txBody>
+          <a:bodyPr rtlCol="0" anchor="ctr"/>
+          <a:lstStyle/>
+          <a:p>
+            <a:pPr algn="ctr"/>
+            <a:endParaRPr lang="it-IT"/>
+          </a:p>
+        </p:txBody>
+      </p:sp>
+      <p:sp>
+        <p:nvSpPr>
+          <p:cNvPr id="76" name="Rettangolo 75"/>
+          <p:cNvSpPr/>
+          <p:nvPr/>
+        </p:nvSpPr>
+        <p:spPr>
+          <a:xfrm>
+            <a:off x="7858594" y="2539131"/>
+            <a:ext cx="2160000" cy="1800000"/>
+          </a:xfrm>
+          <a:prstGeom prst="rect">
+            <a:avLst/>
+          </a:prstGeom>
+          <a:solidFill>
+            <a:srgbClr val="01579B"/>
+          </a:solidFill>
+          <a:ln>
+            <a:noFill/>
+          </a:ln>
+        </p:spPr>
+        <p:style>
+          <a:lnRef idx="2">
+            <a:schemeClr val="accent1">
+              <a:shade val="50000"/>
+            </a:schemeClr>
+          </a:lnRef>
+          <a:fillRef idx="1">
+            <a:schemeClr val="accent1"/>
+          </a:fillRef>
+          <a:effectRef idx="0">
+            <a:schemeClr val="accent1"/>
+          </a:effectRef>
+          <a:fontRef idx="minor">
+            <a:schemeClr val="lt1"/>
+          </a:fontRef>
+        </p:style>
+        <p:txBody>
+          <a:bodyPr rtlCol="0" anchor="ctr"/>
+          <a:lstStyle/>
+          <a:p>
+            <a:pPr algn="ctr"/>
+            <a:endParaRPr lang="it-IT" dirty="0"/>
+          </a:p>
+        </p:txBody>
+      </p:sp>
+      <p:sp>
+        <p:nvSpPr>
+          <p:cNvPr id="79" name="Arco 78"/>
+          <p:cNvSpPr/>
+          <p:nvPr/>
+        </p:nvSpPr>
+        <p:spPr>
+          <a:xfrm rot="5554153">
+            <a:off x="9264506" y="2920082"/>
+            <a:ext cx="540000" cy="540000"/>
+          </a:xfrm>
+          <a:prstGeom prst="arc">
+            <a:avLst>
+              <a:gd name="adj1" fmla="val 5417431"/>
+              <a:gd name="adj2" fmla="val 21395240"/>
+            </a:avLst>
+          </a:prstGeom>
+          <a:ln w="76200">
+            <a:solidFill>
+              <a:schemeClr val="bg1"/>
+            </a:solidFill>
+          </a:ln>
+        </p:spPr>
+        <p:style>
+          <a:lnRef idx="1">
+            <a:schemeClr val="accent1"/>
+          </a:lnRef>
+          <a:fillRef idx="0">
+            <a:schemeClr val="accent1"/>
+          </a:fillRef>
+          <a:effectRef idx="0">
+            <a:schemeClr val="accent1"/>
+          </a:effectRef>
+          <a:fontRef idx="minor">
+            <a:schemeClr val="tx1"/>
+          </a:fontRef>
+        </p:style>
+        <p:txBody>
+          <a:bodyPr rtlCol="0" anchor="ctr"/>
+          <a:lstStyle/>
+          <a:p>
+            <a:pPr algn="ctr"/>
+            <a:endParaRPr lang="it-IT"/>
+          </a:p>
+        </p:txBody>
+      </p:sp>
+      <p:sp>
+        <p:nvSpPr>
+          <p:cNvPr id="80" name="Arco 79"/>
+          <p:cNvSpPr/>
+          <p:nvPr/>
+        </p:nvSpPr>
+        <p:spPr>
+          <a:xfrm rot="10577261">
+            <a:off x="9183211" y="3658899"/>
+            <a:ext cx="216000" cy="216000"/>
+          </a:xfrm>
+          <a:prstGeom prst="arc">
+            <a:avLst>
+              <a:gd name="adj1" fmla="val 5720900"/>
+              <a:gd name="adj2" fmla="val 281018"/>
+            </a:avLst>
+          </a:prstGeom>
+          <a:ln w="76200">
+            <a:solidFill>
+              <a:schemeClr val="bg1"/>
+            </a:solidFill>
+          </a:ln>
+        </p:spPr>
+        <p:style>
+          <a:lnRef idx="1">
+            <a:schemeClr val="accent1"/>
+          </a:lnRef>
+          <a:fillRef idx="0">
+            <a:schemeClr val="accent1"/>
+          </a:fillRef>
+          <a:effectRef idx="0">
+            <a:schemeClr val="accent1"/>
+          </a:effectRef>
+          <a:fontRef idx="minor">
+            <a:schemeClr val="tx1"/>
+          </a:fontRef>
+        </p:style>
+        <p:txBody>
+          <a:bodyPr rtlCol="0" anchor="ctr"/>
+          <a:lstStyle/>
+          <a:p>
+            <a:pPr algn="ctr"/>
+            <a:endParaRPr lang="it-IT"/>
+          </a:p>
+        </p:txBody>
+      </p:sp>
+      <p:grpSp>
+        <p:nvGrpSpPr>
+          <p:cNvPr id="73" name="Gruppo 72"/>
+          <p:cNvGrpSpPr/>
+          <p:nvPr/>
+        </p:nvGrpSpPr>
+        <p:grpSpPr>
+          <a:xfrm>
+            <a:off x="8111132" y="2886882"/>
+            <a:ext cx="1011788" cy="397746"/>
+            <a:chOff x="8141919" y="2723855"/>
+            <a:chExt cx="1011788" cy="397746"/>
+          </a:xfrm>
+        </p:grpSpPr>
+        <p:sp>
+          <p:nvSpPr>
+            <p:cNvPr id="77" name="Arco 76"/>
+            <p:cNvSpPr/>
+            <p:nvPr/>
+          </p:nvSpPr>
+          <p:spPr>
+            <a:xfrm rot="5554153">
+              <a:off x="8793707" y="2723855"/>
+              <a:ext cx="360000" cy="360000"/>
+            </a:xfrm>
+            <a:prstGeom prst="arc">
+              <a:avLst>
+                <a:gd name="adj1" fmla="val 5417431"/>
+                <a:gd name="adj2" fmla="val 281018"/>
+              </a:avLst>
+            </a:prstGeom>
+            <a:ln w="76200">
+              <a:solidFill>
+                <a:schemeClr val="bg1"/>
+              </a:solidFill>
+            </a:ln>
+          </p:spPr>
+          <p:style>
+            <a:lnRef idx="1">
+              <a:schemeClr val="accent1"/>
+            </a:lnRef>
+            <a:fillRef idx="0">
+              <a:schemeClr val="accent1"/>
+            </a:fillRef>
+            <a:effectRef idx="0">
+              <a:schemeClr val="accent1"/>
+            </a:effectRef>
+            <a:fontRef idx="minor">
+              <a:schemeClr val="tx1"/>
+            </a:fontRef>
+          </p:style>
+          <p:txBody>
+            <a:bodyPr rtlCol="0" anchor="ctr"/>
+            <a:lstStyle/>
+            <a:p>
+              <a:pPr algn="ctr"/>
+              <a:endParaRPr lang="it-IT"/>
+            </a:p>
+          </p:txBody>
+        </p:sp>
+        <p:cxnSp>
+          <p:nvCxnSpPr>
+            <p:cNvPr id="26" name="Connettore diritto 25"/>
+            <p:cNvCxnSpPr/>
+            <p:nvPr/>
+          </p:nvCxnSpPr>
+          <p:spPr>
+            <a:xfrm>
+              <a:off x="8290682" y="3086980"/>
+              <a:ext cx="684000" cy="0"/>
+            </a:xfrm>
+            <a:prstGeom prst="line">
+              <a:avLst/>
+            </a:prstGeom>
+            <a:ln w="76200">
+              <a:solidFill>
+                <a:schemeClr val="bg1"/>
+              </a:solidFill>
+            </a:ln>
+          </p:spPr>
+          <p:style>
+            <a:lnRef idx="1">
+              <a:schemeClr val="accent1"/>
+            </a:lnRef>
+            <a:fillRef idx="0">
+              <a:schemeClr val="accent1"/>
+            </a:fillRef>
+            <a:effectRef idx="0">
+              <a:schemeClr val="accent1"/>
+            </a:effectRef>
+            <a:fontRef idx="minor">
+              <a:schemeClr val="tx1"/>
+            </a:fontRef>
+          </p:style>
+        </p:cxnSp>
+        <p:sp>
+          <p:nvSpPr>
+            <p:cNvPr id="84" name="Unità di visualizzazione grafica 83"/>
+            <p:cNvSpPr/>
+            <p:nvPr/>
+          </p:nvSpPr>
+          <p:spPr>
+            <a:xfrm rot="10800000">
+              <a:off x="8141919" y="3046001"/>
+              <a:ext cx="288000" cy="75600"/>
+            </a:xfrm>
+            <a:prstGeom prst="flowChartDisplay">
+              <a:avLst/>
+            </a:prstGeom>
+            <a:solidFill>
+              <a:schemeClr val="bg1"/>
+            </a:solidFill>
+            <a:ln>
+              <a:noFill/>
+            </a:ln>
+          </p:spPr>
+          <p:style>
+            <a:lnRef idx="2">
+              <a:schemeClr val="accent1">
+                <a:shade val="50000"/>
+              </a:schemeClr>
+            </a:lnRef>
+            <a:fillRef idx="1">
+              <a:schemeClr val="accent1"/>
+            </a:fillRef>
+            <a:effectRef idx="0">
+              <a:schemeClr val="accent1"/>
+            </a:effectRef>
+            <a:fontRef idx="minor">
+              <a:schemeClr val="lt1"/>
+            </a:fontRef>
+          </p:style>
+          <p:txBody>
+            <a:bodyPr rtlCol="0" anchor="ctr"/>
+            <a:lstStyle/>
+            <a:p>
+              <a:pPr algn="ctr"/>
+              <a:endParaRPr lang="it-IT"/>
+            </a:p>
+          </p:txBody>
+        </p:sp>
+      </p:grpSp>
+      <p:cxnSp>
+        <p:nvCxnSpPr>
+          <p:cNvPr id="85" name="Connettore diritto 84"/>
+          <p:cNvCxnSpPr/>
+          <p:nvPr/>
+        </p:nvCxnSpPr>
+        <p:spPr>
+          <a:xfrm flipV="1">
+            <a:off x="8101014" y="3462440"/>
+            <a:ext cx="1440000" cy="7118"/>
+          </a:xfrm>
+          <a:prstGeom prst="line">
+            <a:avLst/>
+          </a:prstGeom>
+          <a:ln w="76200">
+            <a:solidFill>
+              <a:schemeClr val="bg1"/>
+            </a:solidFill>
+          </a:ln>
+        </p:spPr>
+        <p:style>
+          <a:lnRef idx="1">
+            <a:schemeClr val="accent1"/>
+          </a:lnRef>
+          <a:fillRef idx="0">
+            <a:schemeClr val="accent1"/>
+          </a:fillRef>
+          <a:effectRef idx="0">
+            <a:schemeClr val="accent1"/>
+          </a:effectRef>
+          <a:fontRef idx="minor">
+            <a:schemeClr val="tx1"/>
+          </a:fontRef>
+        </p:style>
+      </p:cxnSp>
+      <p:sp>
+        <p:nvSpPr>
+          <p:cNvPr id="89" name="Unità di visualizzazione grafica 88"/>
+          <p:cNvSpPr/>
+          <p:nvPr/>
+        </p:nvSpPr>
+        <p:spPr>
+          <a:xfrm rot="10800000">
+            <a:off x="7923301" y="3427517"/>
+            <a:ext cx="288000" cy="75600"/>
+          </a:xfrm>
+          <a:prstGeom prst="flowChartDisplay">
+            <a:avLst/>
+          </a:prstGeom>
+          <a:solidFill>
+            <a:schemeClr val="bg1"/>
+          </a:solidFill>
+          <a:ln>
+            <a:noFill/>
+          </a:ln>
+        </p:spPr>
+        <p:style>
+          <a:lnRef idx="2">
+            <a:schemeClr val="accent1">
+              <a:shade val="50000"/>
+            </a:schemeClr>
+          </a:lnRef>
+          <a:fillRef idx="1">
+            <a:schemeClr val="accent1"/>
+          </a:fillRef>
+          <a:effectRef idx="0">
+            <a:schemeClr val="accent1"/>
+          </a:effectRef>
+          <a:fontRef idx="minor">
+            <a:schemeClr val="lt1"/>
+          </a:fontRef>
+        </p:style>
+        <p:txBody>
+          <a:bodyPr rtlCol="0" anchor="ctr"/>
+          <a:lstStyle/>
+          <a:p>
+            <a:pPr algn="ctr"/>
+            <a:endParaRPr lang="it-IT" dirty="0"/>
+          </a:p>
+        </p:txBody>
+      </p:sp>
+      <p:cxnSp>
+        <p:nvCxnSpPr>
+          <p:cNvPr id="93" name="Connettore diritto 92"/>
+          <p:cNvCxnSpPr/>
+          <p:nvPr/>
+        </p:nvCxnSpPr>
+        <p:spPr>
+          <a:xfrm>
+            <a:off x="8445776" y="3656498"/>
+            <a:ext cx="864000" cy="0"/>
+          </a:xfrm>
+          <a:prstGeom prst="line">
+            <a:avLst/>
+          </a:prstGeom>
+          <a:ln w="76200">
+            <a:solidFill>
+              <a:schemeClr val="bg1"/>
+            </a:solidFill>
+          </a:ln>
+        </p:spPr>
+        <p:style>
+          <a:lnRef idx="1">
+            <a:schemeClr val="accent1"/>
+          </a:lnRef>
+          <a:fillRef idx="0">
+            <a:schemeClr val="accent1"/>
+          </a:fillRef>
+          <a:effectRef idx="0">
+            <a:schemeClr val="accent1"/>
+          </a:effectRef>
+          <a:fontRef idx="minor">
+            <a:schemeClr val="tx1"/>
+          </a:fontRef>
+        </p:style>
+      </p:cxnSp>
+      <p:sp>
+        <p:nvSpPr>
+          <p:cNvPr id="94" name="Unità di visualizzazione grafica 93"/>
+          <p:cNvSpPr/>
+          <p:nvPr/>
+        </p:nvSpPr>
+        <p:spPr>
+          <a:xfrm rot="10800000">
+            <a:off x="8262431" y="3621440"/>
+            <a:ext cx="288000" cy="72000"/>
+          </a:xfrm>
+          <a:prstGeom prst="flowChartDisplay">
+            <a:avLst/>
+          </a:prstGeom>
+          <a:solidFill>
+            <a:schemeClr val="bg1"/>
+          </a:solidFill>
+          <a:ln>
+            <a:noFill/>
+          </a:ln>
+        </p:spPr>
+        <p:style>
+          <a:lnRef idx="2">
+            <a:schemeClr val="accent1">
+              <a:shade val="50000"/>
+            </a:schemeClr>
+          </a:lnRef>
+          <a:fillRef idx="1">
+            <a:schemeClr val="accent1"/>
+          </a:fillRef>
+          <a:effectRef idx="0">
+            <a:schemeClr val="accent1"/>
+          </a:effectRef>
+          <a:fontRef idx="minor">
+            <a:schemeClr val="lt1"/>
+          </a:fontRef>
+        </p:style>
+        <p:txBody>
+          <a:bodyPr rtlCol="0" anchor="ctr"/>
+          <a:lstStyle/>
+          <a:p>
+            <a:pPr algn="ctr"/>
+            <a:endParaRPr lang="it-IT"/>
+          </a:p>
+        </p:txBody>
+      </p:sp>
+      <p:sp>
+        <p:nvSpPr>
+          <p:cNvPr id="96" name="Rettangolo 95"/>
+          <p:cNvSpPr/>
+          <p:nvPr/>
+        </p:nvSpPr>
+        <p:spPr>
+          <a:xfrm>
+            <a:off x="3190588" y="4484054"/>
+            <a:ext cx="2160000" cy="1800000"/>
+          </a:xfrm>
+          <a:prstGeom prst="rect">
+            <a:avLst/>
+          </a:prstGeom>
+          <a:solidFill>
+            <a:srgbClr val="01579B"/>
+          </a:solidFill>
+          <a:ln>
+            <a:noFill/>
+          </a:ln>
+        </p:spPr>
+        <p:style>
+          <a:lnRef idx="2">
+            <a:schemeClr val="accent1">
+              <a:shade val="50000"/>
+            </a:schemeClr>
+          </a:lnRef>
+          <a:fillRef idx="1">
+            <a:schemeClr val="accent1"/>
+          </a:fillRef>
+          <a:effectRef idx="0">
+            <a:schemeClr val="accent1"/>
+          </a:effectRef>
+          <a:fontRef idx="minor">
+            <a:schemeClr val="lt1"/>
+          </a:fontRef>
+        </p:style>
+        <p:txBody>
+          <a:bodyPr rtlCol="0" anchor="ctr"/>
+          <a:lstStyle/>
+          <a:p>
+            <a:pPr algn="ctr"/>
+            <a:endParaRPr lang="it-IT" dirty="0"/>
+          </a:p>
+        </p:txBody>
+      </p:sp>
+      <p:sp>
+        <p:nvSpPr>
+          <p:cNvPr id="97" name="Esagono 96"/>
+          <p:cNvSpPr/>
+          <p:nvPr/>
+        </p:nvSpPr>
+        <p:spPr>
+          <a:xfrm>
+            <a:off x="4072588" y="5204054"/>
+            <a:ext cx="396000" cy="360000"/>
+          </a:xfrm>
+          <a:prstGeom prst="hexagon">
+            <a:avLst/>
+          </a:prstGeom>
+          <a:noFill/>
+          <a:ln w="57150">
+            <a:solidFill>
+              <a:schemeClr val="bg1"/>
+            </a:solidFill>
+          </a:ln>
+        </p:spPr>
+        <p:style>
+          <a:lnRef idx="2">
+            <a:schemeClr val="accent1">
+              <a:shade val="50000"/>
+            </a:schemeClr>
+          </a:lnRef>
+          <a:fillRef idx="1">
+            <a:schemeClr val="accent1"/>
+          </a:fillRef>
+          <a:effectRef idx="0">
+            <a:schemeClr val="accent1"/>
+          </a:effectRef>
+          <a:fontRef idx="minor">
+            <a:schemeClr val="lt1"/>
+          </a:fontRef>
+        </p:style>
+        <p:txBody>
+          <a:bodyPr rtlCol="0" anchor="ctr"/>
+          <a:lstStyle/>
+          <a:p>
+            <a:pPr algn="ctr"/>
+            <a:endParaRPr lang="it-IT"/>
+          </a:p>
+        </p:txBody>
+      </p:sp>
+      <p:sp>
+        <p:nvSpPr>
+          <p:cNvPr id="98" name="Stella a 6 punte 97"/>
+          <p:cNvSpPr/>
+          <p:nvPr/>
+        </p:nvSpPr>
+        <p:spPr>
+          <a:xfrm>
+            <a:off x="4202250" y="5317379"/>
+            <a:ext cx="144000" cy="144000"/>
+          </a:xfrm>
+          <a:prstGeom prst="star6">
+            <a:avLst/>
+          </a:prstGeom>
+          <a:noFill/>
+          <a:ln w="38100">
+            <a:solidFill>
+              <a:schemeClr val="bg1"/>
+            </a:solidFill>
+          </a:ln>
+        </p:spPr>
+        <p:style>
+          <a:lnRef idx="2">
+            <a:schemeClr val="accent1">
+              <a:shade val="50000"/>
+            </a:schemeClr>
+          </a:lnRef>
+          <a:fillRef idx="1">
+            <a:schemeClr val="accent1"/>
+          </a:fillRef>
+          <a:effectRef idx="0">
+            <a:schemeClr val="accent1"/>
+          </a:effectRef>
+          <a:fontRef idx="minor">
+            <a:schemeClr val="lt1"/>
+          </a:fontRef>
+        </p:style>
+        <p:txBody>
+          <a:bodyPr rtlCol="0" anchor="ctr"/>
+          <a:lstStyle/>
+          <a:p>
+            <a:pPr algn="ctr"/>
+            <a:endParaRPr lang="it-IT"/>
+          </a:p>
+        </p:txBody>
+      </p:sp>
+      <p:cxnSp>
+        <p:nvCxnSpPr>
+          <p:cNvPr id="100" name="Connettore diritto 99"/>
+          <p:cNvCxnSpPr/>
+          <p:nvPr/>
+        </p:nvCxnSpPr>
+        <p:spPr>
+          <a:xfrm flipV="1">
+            <a:off x="4394588" y="4772054"/>
+            <a:ext cx="324000" cy="432000"/>
+          </a:xfrm>
+          <a:prstGeom prst="line">
+            <a:avLst/>
+          </a:prstGeom>
+          <a:ln w="76200">
+            <a:solidFill>
+              <a:schemeClr val="bg1"/>
+            </a:solidFill>
+          </a:ln>
+        </p:spPr>
+        <p:style>
+          <a:lnRef idx="1">
+            <a:schemeClr val="accent1"/>
+          </a:lnRef>
+          <a:fillRef idx="0">
+            <a:schemeClr val="accent1"/>
+          </a:fillRef>
+          <a:effectRef idx="0">
+            <a:schemeClr val="accent1"/>
+          </a:effectRef>
+          <a:fontRef idx="minor">
+            <a:schemeClr val="tx1"/>
+          </a:fontRef>
+        </p:style>
+      </p:cxnSp>
+      <p:cxnSp>
+        <p:nvCxnSpPr>
+          <p:cNvPr id="104" name="Connettore diritto 103"/>
+          <p:cNvCxnSpPr/>
+          <p:nvPr/>
+        </p:nvCxnSpPr>
+        <p:spPr>
+          <a:xfrm flipV="1">
+            <a:off x="3845990" y="5564054"/>
+            <a:ext cx="324000" cy="432000"/>
+          </a:xfrm>
+          <a:prstGeom prst="line">
+            <a:avLst/>
+          </a:prstGeom>
+          <a:ln w="76200">
+            <a:solidFill>
+              <a:schemeClr val="bg1"/>
+            </a:solidFill>
+          </a:ln>
+        </p:spPr>
+        <p:style>
+          <a:lnRef idx="1">
+            <a:schemeClr val="accent1"/>
+          </a:lnRef>
+          <a:fillRef idx="0">
+            <a:schemeClr val="accent1"/>
+          </a:fillRef>
+          <a:effectRef idx="0">
+            <a:schemeClr val="accent1"/>
+          </a:effectRef>
+          <a:fontRef idx="minor">
+            <a:schemeClr val="tx1"/>
+          </a:fontRef>
+        </p:style>
+      </p:cxnSp>
+      <p:cxnSp>
+        <p:nvCxnSpPr>
+          <p:cNvPr id="105" name="Connettore diritto 104"/>
+          <p:cNvCxnSpPr/>
+          <p:nvPr/>
+        </p:nvCxnSpPr>
+        <p:spPr>
+          <a:xfrm flipH="1" flipV="1">
+            <a:off x="4378508" y="5542308"/>
+            <a:ext cx="324000" cy="432000"/>
+          </a:xfrm>
+          <a:prstGeom prst="line">
+            <a:avLst/>
+          </a:prstGeom>
+          <a:ln w="76200">
+            <a:solidFill>
+              <a:schemeClr val="bg1"/>
+            </a:solidFill>
+          </a:ln>
+        </p:spPr>
+        <p:style>
+          <a:lnRef idx="1">
+            <a:schemeClr val="accent1"/>
+          </a:lnRef>
+          <a:fillRef idx="0">
+            <a:schemeClr val="accent1"/>
+          </a:fillRef>
+          <a:effectRef idx="0">
+            <a:schemeClr val="accent1"/>
+          </a:effectRef>
+          <a:fontRef idx="minor">
+            <a:schemeClr val="tx1"/>
+          </a:fontRef>
+        </p:style>
+      </p:cxnSp>
+      <p:cxnSp>
+        <p:nvCxnSpPr>
+          <p:cNvPr id="107" name="Connettore diritto 106"/>
+          <p:cNvCxnSpPr/>
+          <p:nvPr/>
+        </p:nvCxnSpPr>
+        <p:spPr>
+          <a:xfrm flipH="1" flipV="1">
+            <a:off x="3836668" y="4782556"/>
+            <a:ext cx="324000" cy="432000"/>
+          </a:xfrm>
+          <a:prstGeom prst="line">
+            <a:avLst/>
+          </a:prstGeom>
+          <a:ln w="76200">
+            <a:solidFill>
+              <a:schemeClr val="bg1"/>
+            </a:solidFill>
+          </a:ln>
+        </p:spPr>
+        <p:style>
+          <a:lnRef idx="1">
+            <a:schemeClr val="accent1"/>
+          </a:lnRef>
+          <a:fillRef idx="0">
+            <a:schemeClr val="accent1"/>
+          </a:fillRef>
+          <a:effectRef idx="0">
+            <a:schemeClr val="accent1"/>
+          </a:effectRef>
+          <a:fontRef idx="minor">
+            <a:schemeClr val="tx1"/>
+          </a:fontRef>
+        </p:style>
+      </p:cxnSp>
+      <p:cxnSp>
+        <p:nvCxnSpPr>
+          <p:cNvPr id="108" name="Connettore diritto 107"/>
+          <p:cNvCxnSpPr/>
+          <p:nvPr/>
+        </p:nvCxnSpPr>
+        <p:spPr>
+          <a:xfrm>
+            <a:off x="4466474" y="5393958"/>
+            <a:ext cx="403976" cy="2796"/>
+          </a:xfrm>
+          <a:prstGeom prst="line">
+            <a:avLst/>
+          </a:prstGeom>
+          <a:ln w="76200">
+            <a:solidFill>
+              <a:schemeClr val="bg1"/>
+            </a:solidFill>
+          </a:ln>
+        </p:spPr>
+        <p:style>
+          <a:lnRef idx="1">
+            <a:schemeClr val="accent1"/>
+          </a:lnRef>
+          <a:fillRef idx="0">
+            <a:schemeClr val="accent1"/>
+          </a:fillRef>
+          <a:effectRef idx="0">
+            <a:schemeClr val="accent1"/>
+          </a:effectRef>
+          <a:fontRef idx="minor">
+            <a:schemeClr val="tx1"/>
+          </a:fontRef>
+        </p:style>
+      </p:cxnSp>
+      <p:cxnSp>
+        <p:nvCxnSpPr>
+          <p:cNvPr id="111" name="Connettore diritto 110"/>
+          <p:cNvCxnSpPr/>
+          <p:nvPr/>
+        </p:nvCxnSpPr>
+        <p:spPr>
+          <a:xfrm>
+            <a:off x="3670726" y="5381258"/>
+            <a:ext cx="403976" cy="2796"/>
+          </a:xfrm>
+          <a:prstGeom prst="line">
+            <a:avLst/>
+          </a:prstGeom>
+          <a:ln w="76200">
+            <a:solidFill>
+              <a:schemeClr val="bg1"/>
+            </a:solidFill>
+          </a:ln>
+        </p:spPr>
+        <p:style>
+          <a:lnRef idx="1">
+            <a:schemeClr val="accent1"/>
+          </a:lnRef>
+          <a:fillRef idx="0">
+            <a:schemeClr val="accent1"/>
+          </a:fillRef>
+          <a:effectRef idx="0">
+            <a:schemeClr val="accent1"/>
+          </a:effectRef>
+          <a:fontRef idx="minor">
+            <a:schemeClr val="tx1"/>
+          </a:fontRef>
+        </p:style>
+      </p:cxnSp>
+      <p:cxnSp>
+        <p:nvCxnSpPr>
+          <p:cNvPr id="112" name="Connettore diritto 111"/>
+          <p:cNvCxnSpPr/>
+          <p:nvPr/>
+        </p:nvCxnSpPr>
+        <p:spPr>
+          <a:xfrm flipV="1">
+            <a:off x="4675038" y="4765201"/>
+            <a:ext cx="208462" cy="59909"/>
+          </a:xfrm>
+          <a:prstGeom prst="line">
+            <a:avLst/>
+          </a:prstGeom>
+          <a:ln w="76200">
+            <a:solidFill>
+              <a:schemeClr val="bg1"/>
+            </a:solidFill>
+          </a:ln>
+        </p:spPr>
+        <p:style>
+          <a:lnRef idx="1">
+            <a:schemeClr val="accent1"/>
+          </a:lnRef>
+          <a:fillRef idx="0">
+            <a:schemeClr val="accent1"/>
+          </a:fillRef>
+          <a:effectRef idx="0">
+            <a:schemeClr val="accent1"/>
+          </a:effectRef>
+          <a:fontRef idx="minor">
+            <a:schemeClr val="tx1"/>
+          </a:fontRef>
+        </p:style>
+      </p:cxnSp>
+      <p:cxnSp>
+        <p:nvCxnSpPr>
+          <p:cNvPr id="115" name="Connettore diritto 114"/>
+          <p:cNvCxnSpPr/>
+          <p:nvPr/>
+        </p:nvCxnSpPr>
+        <p:spPr>
+          <a:xfrm flipV="1">
+            <a:off x="4689302" y="4626500"/>
+            <a:ext cx="13206" cy="192826"/>
+          </a:xfrm>
+          <a:prstGeom prst="line">
+            <a:avLst/>
+          </a:prstGeom>
+          <a:ln w="76200">
+            <a:solidFill>
+              <a:schemeClr val="bg1"/>
+            </a:solidFill>
+          </a:ln>
+        </p:spPr>
+        <p:style>
+          <a:lnRef idx="1">
+            <a:schemeClr val="accent1"/>
+          </a:lnRef>
+          <a:fillRef idx="0">
+            <a:schemeClr val="accent1"/>
+          </a:fillRef>
+          <a:effectRef idx="0">
+            <a:schemeClr val="accent1"/>
+          </a:effectRef>
+          <a:fontRef idx="minor">
+            <a:schemeClr val="tx1"/>
+          </a:fontRef>
+        </p:style>
+      </p:cxnSp>
+      <p:grpSp>
+        <p:nvGrpSpPr>
+          <p:cNvPr id="121" name="Gruppo 120"/>
+          <p:cNvGrpSpPr/>
+          <p:nvPr/>
+        </p:nvGrpSpPr>
+        <p:grpSpPr>
+          <a:xfrm rot="11015637">
+            <a:off x="3658231" y="5971105"/>
+            <a:ext cx="208462" cy="198610"/>
+            <a:chOff x="3453271" y="5797444"/>
+            <a:chExt cx="208462" cy="198610"/>
+          </a:xfrm>
+        </p:grpSpPr>
+        <p:cxnSp>
+          <p:nvCxnSpPr>
+            <p:cNvPr id="119" name="Connettore diritto 118"/>
+            <p:cNvCxnSpPr/>
+            <p:nvPr/>
+          </p:nvCxnSpPr>
+          <p:spPr>
+            <a:xfrm flipV="1">
+              <a:off x="3453271" y="5936145"/>
+              <a:ext cx="208462" cy="59909"/>
+            </a:xfrm>
+            <a:prstGeom prst="line">
+              <a:avLst/>
+            </a:prstGeom>
+            <a:ln w="76200">
+              <a:solidFill>
+                <a:schemeClr val="bg1"/>
+              </a:solidFill>
+            </a:ln>
+          </p:spPr>
+          <p:style>
+            <a:lnRef idx="1">
+              <a:schemeClr val="accent1"/>
+            </a:lnRef>
+            <a:fillRef idx="0">
+              <a:schemeClr val="accent1"/>
+            </a:fillRef>
+            <a:effectRef idx="0">
+              <a:schemeClr val="accent1"/>
+            </a:effectRef>
+            <a:fontRef idx="minor">
+              <a:schemeClr val="tx1"/>
+            </a:fontRef>
+          </p:style>
+        </p:cxnSp>
+        <p:cxnSp>
+          <p:nvCxnSpPr>
+            <p:cNvPr id="120" name="Connettore diritto 119"/>
+            <p:cNvCxnSpPr/>
+            <p:nvPr/>
+          </p:nvCxnSpPr>
+          <p:spPr>
+            <a:xfrm flipV="1">
+              <a:off x="3467535" y="5797444"/>
+              <a:ext cx="13206" cy="192826"/>
+            </a:xfrm>
+            <a:prstGeom prst="line">
+              <a:avLst/>
+            </a:prstGeom>
+            <a:ln w="76200">
+              <a:solidFill>
+                <a:schemeClr val="bg1"/>
+              </a:solidFill>
+            </a:ln>
+          </p:spPr>
+          <p:style>
+            <a:lnRef idx="1">
+              <a:schemeClr val="accent1"/>
+            </a:lnRef>
+            <a:fillRef idx="0">
+              <a:schemeClr val="accent1"/>
+            </a:fillRef>
+            <a:effectRef idx="0">
+              <a:schemeClr val="accent1"/>
+            </a:effectRef>
+            <a:fontRef idx="minor">
+              <a:schemeClr val="tx1"/>
+            </a:fontRef>
+          </p:style>
+        </p:cxnSp>
+      </p:grpSp>
+      <p:grpSp>
+        <p:nvGrpSpPr>
+          <p:cNvPr id="124" name="Gruppo 123"/>
+          <p:cNvGrpSpPr/>
+          <p:nvPr/>
+        </p:nvGrpSpPr>
+        <p:grpSpPr>
+          <a:xfrm rot="6311075">
+            <a:off x="4651466" y="5987269"/>
+            <a:ext cx="208462" cy="198610"/>
+            <a:chOff x="4827438" y="4778900"/>
+            <a:chExt cx="208462" cy="198610"/>
+          </a:xfrm>
+        </p:grpSpPr>
+        <p:cxnSp>
+          <p:nvCxnSpPr>
+            <p:cNvPr id="122" name="Connettore diritto 121"/>
+            <p:cNvCxnSpPr/>
+            <p:nvPr/>
+          </p:nvCxnSpPr>
+          <p:spPr>
+            <a:xfrm flipV="1">
+              <a:off x="4827438" y="4917601"/>
+              <a:ext cx="208462" cy="59909"/>
+            </a:xfrm>
+            <a:prstGeom prst="line">
+              <a:avLst/>
+            </a:prstGeom>
+            <a:ln w="76200">
+              <a:solidFill>
+                <a:schemeClr val="bg1"/>
+              </a:solidFill>
+            </a:ln>
+          </p:spPr>
+          <p:style>
+            <a:lnRef idx="1">
+              <a:schemeClr val="accent1"/>
+            </a:lnRef>
+            <a:fillRef idx="0">
+              <a:schemeClr val="accent1"/>
+            </a:fillRef>
+            <a:effectRef idx="0">
+              <a:schemeClr val="accent1"/>
+            </a:effectRef>
+            <a:fontRef idx="minor">
+              <a:schemeClr val="tx1"/>
+            </a:fontRef>
+          </p:style>
+        </p:cxnSp>
+        <p:cxnSp>
+          <p:nvCxnSpPr>
+            <p:cNvPr id="123" name="Connettore diritto 122"/>
+            <p:cNvCxnSpPr/>
+            <p:nvPr/>
+          </p:nvCxnSpPr>
+          <p:spPr>
+            <a:xfrm flipV="1">
+              <a:off x="4841702" y="4778900"/>
+              <a:ext cx="13206" cy="192826"/>
+            </a:xfrm>
+            <a:prstGeom prst="line">
+              <a:avLst/>
+            </a:prstGeom>
+            <a:ln w="76200">
+              <a:solidFill>
+                <a:schemeClr val="bg1"/>
+              </a:solidFill>
+            </a:ln>
+          </p:spPr>
+          <p:style>
+            <a:lnRef idx="1">
+              <a:schemeClr val="accent1"/>
+            </a:lnRef>
+            <a:fillRef idx="0">
+              <a:schemeClr val="accent1"/>
+            </a:fillRef>
+            <a:effectRef idx="0">
+              <a:schemeClr val="accent1"/>
+            </a:effectRef>
+            <a:fontRef idx="minor">
+              <a:schemeClr val="tx1"/>
+            </a:fontRef>
+          </p:style>
+        </p:cxnSp>
+      </p:grpSp>
+      <p:grpSp>
+        <p:nvGrpSpPr>
+          <p:cNvPr id="125" name="Gruppo 124"/>
+          <p:cNvGrpSpPr/>
+          <p:nvPr/>
+        </p:nvGrpSpPr>
+        <p:grpSpPr>
+          <a:xfrm rot="17172174">
+            <a:off x="3704721" y="4630998"/>
+            <a:ext cx="208462" cy="198610"/>
+            <a:chOff x="4827438" y="4778900"/>
+            <a:chExt cx="208462" cy="198610"/>
+          </a:xfrm>
+        </p:grpSpPr>
+        <p:cxnSp>
+          <p:nvCxnSpPr>
+            <p:cNvPr id="126" name="Connettore diritto 125"/>
+            <p:cNvCxnSpPr/>
+            <p:nvPr/>
+          </p:nvCxnSpPr>
+          <p:spPr>
+            <a:xfrm flipV="1">
+              <a:off x="4827438" y="4917601"/>
+              <a:ext cx="208462" cy="59909"/>
+            </a:xfrm>
+            <a:prstGeom prst="line">
+              <a:avLst/>
+            </a:prstGeom>
+            <a:ln w="76200">
+              <a:solidFill>
+                <a:schemeClr val="bg1"/>
+              </a:solidFill>
+            </a:ln>
+          </p:spPr>
+          <p:style>
+            <a:lnRef idx="1">
+              <a:schemeClr val="accent1"/>
+            </a:lnRef>
+            <a:fillRef idx="0">
+              <a:schemeClr val="accent1"/>
+            </a:fillRef>
+            <a:effectRef idx="0">
+              <a:schemeClr val="accent1"/>
+            </a:effectRef>
+            <a:fontRef idx="minor">
+              <a:schemeClr val="tx1"/>
+            </a:fontRef>
+          </p:style>
+        </p:cxnSp>
+        <p:cxnSp>
+          <p:nvCxnSpPr>
+            <p:cNvPr id="127" name="Connettore diritto 126"/>
+            <p:cNvCxnSpPr/>
+            <p:nvPr/>
+          </p:nvCxnSpPr>
+          <p:spPr>
+            <a:xfrm flipV="1">
+              <a:off x="4841702" y="4778900"/>
+              <a:ext cx="13206" cy="192826"/>
+            </a:xfrm>
+            <a:prstGeom prst="line">
+              <a:avLst/>
+            </a:prstGeom>
+            <a:ln w="76200">
+              <a:solidFill>
+                <a:schemeClr val="bg1"/>
+              </a:solidFill>
+            </a:ln>
+          </p:spPr>
+          <p:style>
+            <a:lnRef idx="1">
+              <a:schemeClr val="accent1"/>
+            </a:lnRef>
+            <a:fillRef idx="0">
+              <a:schemeClr val="accent1"/>
+            </a:fillRef>
+            <a:effectRef idx="0">
+              <a:schemeClr val="accent1"/>
+            </a:effectRef>
+            <a:fontRef idx="minor">
+              <a:schemeClr val="tx1"/>
+            </a:fontRef>
+          </p:style>
+        </p:cxnSp>
+      </p:grpSp>
+      <p:grpSp>
+        <p:nvGrpSpPr>
+          <p:cNvPr id="128" name="Gruppo 127"/>
+          <p:cNvGrpSpPr/>
+          <p:nvPr/>
+        </p:nvGrpSpPr>
+        <p:grpSpPr>
+          <a:xfrm rot="3475277">
+            <a:off x="4886442" y="5323694"/>
+            <a:ext cx="208462" cy="198610"/>
+            <a:chOff x="4827438" y="4778900"/>
+            <a:chExt cx="208462" cy="198610"/>
+          </a:xfrm>
+        </p:grpSpPr>
+        <p:cxnSp>
+          <p:nvCxnSpPr>
+            <p:cNvPr id="129" name="Connettore diritto 128"/>
+            <p:cNvCxnSpPr/>
+            <p:nvPr/>
+          </p:nvCxnSpPr>
+          <p:spPr>
+            <a:xfrm flipV="1">
+              <a:off x="4827438" y="4917601"/>
+              <a:ext cx="208462" cy="59909"/>
+            </a:xfrm>
+            <a:prstGeom prst="line">
+              <a:avLst/>
+            </a:prstGeom>
+            <a:ln w="76200">
+              <a:solidFill>
+                <a:schemeClr val="bg1"/>
+              </a:solidFill>
+            </a:ln>
+          </p:spPr>
+          <p:style>
+            <a:lnRef idx="1">
+              <a:schemeClr val="accent1"/>
+            </a:lnRef>
+            <a:fillRef idx="0">
+              <a:schemeClr val="accent1"/>
+            </a:fillRef>
+            <a:effectRef idx="0">
+              <a:schemeClr val="accent1"/>
+            </a:effectRef>
+            <a:fontRef idx="minor">
+              <a:schemeClr val="tx1"/>
+            </a:fontRef>
+          </p:style>
+        </p:cxnSp>
+        <p:cxnSp>
+          <p:nvCxnSpPr>
+            <p:cNvPr id="130" name="Connettore diritto 129"/>
+            <p:cNvCxnSpPr/>
+            <p:nvPr/>
+          </p:nvCxnSpPr>
+          <p:spPr>
+            <a:xfrm flipV="1">
+              <a:off x="4841702" y="4778900"/>
+              <a:ext cx="13206" cy="192826"/>
+            </a:xfrm>
+            <a:prstGeom prst="line">
+              <a:avLst/>
+            </a:prstGeom>
+            <a:ln w="76200">
+              <a:solidFill>
+                <a:schemeClr val="bg1"/>
+              </a:solidFill>
+            </a:ln>
+          </p:spPr>
+          <p:style>
+            <a:lnRef idx="1">
+              <a:schemeClr val="accent1"/>
+            </a:lnRef>
+            <a:fillRef idx="0">
+              <a:schemeClr val="accent1"/>
+            </a:fillRef>
+            <a:effectRef idx="0">
+              <a:schemeClr val="accent1"/>
+            </a:effectRef>
+            <a:fontRef idx="minor">
+              <a:schemeClr val="tx1"/>
+            </a:fontRef>
+          </p:style>
+        </p:cxnSp>
+      </p:grpSp>
+      <p:grpSp>
+        <p:nvGrpSpPr>
+          <p:cNvPr id="131" name="Gruppo 130"/>
+          <p:cNvGrpSpPr/>
+          <p:nvPr/>
+        </p:nvGrpSpPr>
+        <p:grpSpPr>
+          <a:xfrm rot="14027174">
+            <a:off x="3438946" y="5265341"/>
+            <a:ext cx="208462" cy="198610"/>
+            <a:chOff x="4827438" y="4778900"/>
+            <a:chExt cx="208462" cy="198610"/>
+          </a:xfrm>
+        </p:grpSpPr>
+        <p:cxnSp>
+          <p:nvCxnSpPr>
+            <p:cNvPr id="132" name="Connettore diritto 131"/>
+            <p:cNvCxnSpPr/>
+            <p:nvPr/>
+          </p:nvCxnSpPr>
+          <p:spPr>
+            <a:xfrm flipV="1">
+              <a:off x="4827438" y="4917601"/>
+              <a:ext cx="208462" cy="59909"/>
+            </a:xfrm>
+            <a:prstGeom prst="line">
+              <a:avLst/>
+            </a:prstGeom>
+            <a:ln w="76200">
+              <a:solidFill>
+                <a:schemeClr val="bg1"/>
+              </a:solidFill>
+            </a:ln>
+          </p:spPr>
+          <p:style>
+            <a:lnRef idx="1">
+              <a:schemeClr val="accent1"/>
+            </a:lnRef>
+            <a:fillRef idx="0">
+              <a:schemeClr val="accent1"/>
+            </a:fillRef>
+            <a:effectRef idx="0">
+              <a:schemeClr val="accent1"/>
+            </a:effectRef>
+            <a:fontRef idx="minor">
+              <a:schemeClr val="tx1"/>
+            </a:fontRef>
+          </p:style>
+        </p:cxnSp>
+        <p:cxnSp>
+          <p:nvCxnSpPr>
+            <p:cNvPr id="133" name="Connettore diritto 132"/>
+            <p:cNvCxnSpPr/>
+            <p:nvPr/>
+          </p:nvCxnSpPr>
+          <p:spPr>
+            <a:xfrm flipV="1">
+              <a:off x="4841702" y="4778900"/>
+              <a:ext cx="13206" cy="192826"/>
+            </a:xfrm>
+            <a:prstGeom prst="line">
+              <a:avLst/>
+            </a:prstGeom>
+            <a:ln w="76200">
+              <a:solidFill>
+                <a:schemeClr val="bg1"/>
+              </a:solidFill>
+            </a:ln>
+          </p:spPr>
+          <p:style>
+            <a:lnRef idx="1">
+              <a:schemeClr val="accent1"/>
+            </a:lnRef>
+            <a:fillRef idx="0">
+              <a:schemeClr val="accent1"/>
+            </a:fillRef>
+            <a:effectRef idx="0">
+              <a:schemeClr val="accent1"/>
+            </a:effectRef>
+            <a:fontRef idx="minor">
+              <a:schemeClr val="tx1"/>
+            </a:fontRef>
+          </p:style>
+        </p:cxnSp>
+      </p:grpSp>
+      <p:grpSp>
+        <p:nvGrpSpPr>
+          <p:cNvPr id="134" name="Gruppo 133"/>
+          <p:cNvGrpSpPr/>
+          <p:nvPr/>
+        </p:nvGrpSpPr>
+        <p:grpSpPr>
+          <a:xfrm rot="3475277">
+            <a:off x="4605827" y="5310936"/>
+            <a:ext cx="208462" cy="198610"/>
+            <a:chOff x="4827438" y="4778900"/>
+            <a:chExt cx="208462" cy="198610"/>
+          </a:xfrm>
+        </p:grpSpPr>
+        <p:cxnSp>
+          <p:nvCxnSpPr>
+            <p:cNvPr id="135" name="Connettore diritto 134"/>
+            <p:cNvCxnSpPr/>
+            <p:nvPr/>
+          </p:nvCxnSpPr>
+          <p:spPr>
+            <a:xfrm flipV="1">
+              <a:off x="4827438" y="4917601"/>
+              <a:ext cx="208462" cy="59909"/>
+            </a:xfrm>
+            <a:prstGeom prst="line">
+              <a:avLst/>
+            </a:prstGeom>
+            <a:ln w="76200">
+              <a:solidFill>
+                <a:schemeClr val="bg1"/>
+              </a:solidFill>
+            </a:ln>
+          </p:spPr>
+          <p:style>
+            <a:lnRef idx="1">
+              <a:schemeClr val="accent1"/>
+            </a:lnRef>
+            <a:fillRef idx="0">
+              <a:schemeClr val="accent1"/>
+            </a:fillRef>
+            <a:effectRef idx="0">
+              <a:schemeClr val="accent1"/>
+            </a:effectRef>
+            <a:fontRef idx="minor">
+              <a:schemeClr val="tx1"/>
+            </a:fontRef>
+          </p:style>
+        </p:cxnSp>
+        <p:cxnSp>
+          <p:nvCxnSpPr>
+            <p:cNvPr id="136" name="Connettore diritto 135"/>
+            <p:cNvCxnSpPr/>
+            <p:nvPr/>
+          </p:nvCxnSpPr>
+          <p:spPr>
+            <a:xfrm flipV="1">
+              <a:off x="4841702" y="4778900"/>
+              <a:ext cx="13206" cy="192826"/>
+            </a:xfrm>
+            <a:prstGeom prst="line">
+              <a:avLst/>
+            </a:prstGeom>
+            <a:ln w="76200">
+              <a:solidFill>
+                <a:schemeClr val="bg1"/>
+              </a:solidFill>
+            </a:ln>
+          </p:spPr>
+          <p:style>
+            <a:lnRef idx="1">
+              <a:schemeClr val="accent1"/>
+            </a:lnRef>
+            <a:fillRef idx="0">
+              <a:schemeClr val="accent1"/>
+            </a:fillRef>
+            <a:effectRef idx="0">
+              <a:schemeClr val="accent1"/>
+            </a:effectRef>
+            <a:fontRef idx="minor">
+              <a:schemeClr val="tx1"/>
+            </a:fontRef>
+          </p:style>
+        </p:cxnSp>
       </p:grpSp>
     </p:spTree>
     <p:extLst>

</xml_diff>